<commit_message>
Update PPT v2 after meeting
</commit_message>
<xml_diff>
--- a/DS6306 Group Project 1.pptx
+++ b/DS6306 Group Project 1.pptx
@@ -158,7 +158,7 @@
 <file path=ppt/revisionInfo.xml><?xml version="1.0" encoding="utf-8"?>
 <p1510:revInfo xmlns:a="http://schemas.openxmlformats.org/drawingml/2006/main" xmlns:r="http://schemas.openxmlformats.org/officeDocument/2006/relationships" xmlns:p1510="http://schemas.microsoft.com/office/powerpoint/2015/10/main">
   <p1510:revLst>
-    <p1510:client id="{61374EC2-74A0-4B7E-A59A-1715CE5DD16C}" v="104" dt="2020-02-20T20:04:20.896"/>
+    <p1510:client id="{61374EC2-74A0-4B7E-A59A-1715CE5DD16C}" v="143" dt="2020-02-21T03:40:18.749"/>
   </p1510:revLst>
 </p1510:revInfo>
 </file>
@@ -168,12 +168,12 @@
   <pc:docChgLst>
     <pc:chgData name="Thad Schwebke" userId="8a3b078b179e4a90" providerId="LiveId" clId="{61374EC2-74A0-4B7E-A59A-1715CE5DD16C}"/>
     <pc:docChg chg="custSel addSld modSld sldOrd">
-      <pc:chgData name="Thad Schwebke" userId="8a3b078b179e4a90" providerId="LiveId" clId="{61374EC2-74A0-4B7E-A59A-1715CE5DD16C}" dt="2020-02-20T20:04:20.896" v="317" actId="14100"/>
+      <pc:chgData name="Thad Schwebke" userId="8a3b078b179e4a90" providerId="LiveId" clId="{61374EC2-74A0-4B7E-A59A-1715CE5DD16C}" dt="2020-02-21T03:40:18.747" v="608" actId="1076"/>
       <pc:docMkLst>
         <pc:docMk/>
       </pc:docMkLst>
       <pc:sldChg chg="addSp delSp modSp add">
-        <pc:chgData name="Thad Schwebke" userId="8a3b078b179e4a90" providerId="LiveId" clId="{61374EC2-74A0-4B7E-A59A-1715CE5DD16C}" dt="2020-02-20T19:52:06.950" v="184" actId="1076"/>
+        <pc:chgData name="Thad Schwebke" userId="8a3b078b179e4a90" providerId="LiveId" clId="{61374EC2-74A0-4B7E-A59A-1715CE5DD16C}" dt="2020-02-21T03:22:56.605" v="555" actId="1076"/>
         <pc:sldMkLst>
           <pc:docMk/>
           <pc:sldMk cId="3849262026" sldId="261"/>
@@ -194,6 +194,14 @@
             <ac:spMk id="3" creationId="{6891D4FA-95B5-434E-9A49-0EB803F21D5B}"/>
           </ac:spMkLst>
         </pc:spChg>
+        <pc:spChg chg="add mod">
+          <ac:chgData name="Thad Schwebke" userId="8a3b078b179e4a90" providerId="LiveId" clId="{61374EC2-74A0-4B7E-A59A-1715CE5DD16C}" dt="2020-02-21T03:22:56.605" v="555" actId="1076"/>
+          <ac:spMkLst>
+            <pc:docMk/>
+            <pc:sldMk cId="3849262026" sldId="261"/>
+            <ac:spMk id="5" creationId="{FD335EB1-3900-4747-9EEA-41A3AF0CFA02}"/>
+          </ac:spMkLst>
+        </pc:spChg>
         <pc:picChg chg="add del">
           <ac:chgData name="Thad Schwebke" userId="8a3b078b179e4a90" providerId="LiveId" clId="{61374EC2-74A0-4B7E-A59A-1715CE5DD16C}" dt="2020-02-20T19:50:38.395" v="172"/>
           <ac:picMkLst>
@@ -203,7 +211,7 @@
           </ac:picMkLst>
         </pc:picChg>
         <pc:picChg chg="add mod">
-          <ac:chgData name="Thad Schwebke" userId="8a3b078b179e4a90" providerId="LiveId" clId="{61374EC2-74A0-4B7E-A59A-1715CE5DD16C}" dt="2020-02-20T19:52:06.950" v="184" actId="1076"/>
+          <ac:chgData name="Thad Schwebke" userId="8a3b078b179e4a90" providerId="LiveId" clId="{61374EC2-74A0-4B7E-A59A-1715CE5DD16C}" dt="2020-02-21T03:09:10.904" v="318" actId="1076"/>
           <ac:picMkLst>
             <pc:docMk/>
             <pc:sldMk cId="3849262026" sldId="261"/>
@@ -220,7 +228,7 @@
         </pc:picChg>
       </pc:sldChg>
       <pc:sldChg chg="addSp delSp modSp add">
-        <pc:chgData name="Thad Schwebke" userId="8a3b078b179e4a90" providerId="LiveId" clId="{61374EC2-74A0-4B7E-A59A-1715CE5DD16C}" dt="2020-02-20T19:53:50.087" v="194" actId="1076"/>
+        <pc:chgData name="Thad Schwebke" userId="8a3b078b179e4a90" providerId="LiveId" clId="{61374EC2-74A0-4B7E-A59A-1715CE5DD16C}" dt="2020-02-21T03:15:59.378" v="426" actId="1076"/>
         <pc:sldMkLst>
           <pc:docMk/>
           <pc:sldMk cId="2460916010" sldId="262"/>
@@ -233,12 +241,52 @@
             <ac:spMk id="2" creationId="{6FE82648-CE36-4A2B-B3C3-9EBD346029FA}"/>
           </ac:spMkLst>
         </pc:spChg>
+        <pc:spChg chg="add del mod">
+          <ac:chgData name="Thad Schwebke" userId="8a3b078b179e4a90" providerId="LiveId" clId="{61374EC2-74A0-4B7E-A59A-1715CE5DD16C}" dt="2020-02-21T03:13:11.622" v="336" actId="478"/>
+          <ac:spMkLst>
+            <pc:docMk/>
+            <pc:sldMk cId="2460916010" sldId="262"/>
+            <ac:spMk id="3" creationId="{79F601A8-7436-4B0E-BFDD-83ABA6D9DF8F}"/>
+          </ac:spMkLst>
+        </pc:spChg>
         <pc:spChg chg="del">
           <ac:chgData name="Thad Schwebke" userId="8a3b078b179e4a90" providerId="LiveId" clId="{61374EC2-74A0-4B7E-A59A-1715CE5DD16C}" dt="2020-02-20T19:52:55.269" v="185" actId="478"/>
           <ac:spMkLst>
             <pc:docMk/>
             <pc:sldMk cId="2460916010" sldId="262"/>
             <ac:spMk id="3" creationId="{F77C66F3-455E-43B8-91AC-5BA43D05E23D}"/>
+          </ac:spMkLst>
+        </pc:spChg>
+        <pc:spChg chg="add del mod">
+          <ac:chgData name="Thad Schwebke" userId="8a3b078b179e4a90" providerId="LiveId" clId="{61374EC2-74A0-4B7E-A59A-1715CE5DD16C}" dt="2020-02-21T03:12:29.683" v="333" actId="478"/>
+          <ac:spMkLst>
+            <pc:docMk/>
+            <pc:sldMk cId="2460916010" sldId="262"/>
+            <ac:spMk id="7" creationId="{772AA0AE-ED91-4756-879B-CA129422E89E}"/>
+          </ac:spMkLst>
+        </pc:spChg>
+        <pc:spChg chg="add del mod">
+          <ac:chgData name="Thad Schwebke" userId="8a3b078b179e4a90" providerId="LiveId" clId="{61374EC2-74A0-4B7E-A59A-1715CE5DD16C}" dt="2020-02-21T03:13:12.579" v="337" actId="478"/>
+          <ac:spMkLst>
+            <pc:docMk/>
+            <pc:sldMk cId="2460916010" sldId="262"/>
+            <ac:spMk id="8" creationId="{0EBF7CEC-20DD-4AA2-9A31-0846D189D05C}"/>
+          </ac:spMkLst>
+        </pc:spChg>
+        <pc:spChg chg="add mod">
+          <ac:chgData name="Thad Schwebke" userId="8a3b078b179e4a90" providerId="LiveId" clId="{61374EC2-74A0-4B7E-A59A-1715CE5DD16C}" dt="2020-02-21T03:13:39.022" v="390" actId="14100"/>
+          <ac:spMkLst>
+            <pc:docMk/>
+            <pc:sldMk cId="2460916010" sldId="262"/>
+            <ac:spMk id="9" creationId="{9DAB8808-38A7-46F2-B73D-F269E6BEEAC4}"/>
+          </ac:spMkLst>
+        </pc:spChg>
+        <pc:spChg chg="add mod">
+          <ac:chgData name="Thad Schwebke" userId="8a3b078b179e4a90" providerId="LiveId" clId="{61374EC2-74A0-4B7E-A59A-1715CE5DD16C}" dt="2020-02-21T03:15:59.378" v="426" actId="1076"/>
+          <ac:spMkLst>
+            <pc:docMk/>
+            <pc:sldMk cId="2460916010" sldId="262"/>
+            <ac:spMk id="10" creationId="{A973A35B-416D-479B-8384-685CCE1BDDDC}"/>
           </ac:spMkLst>
         </pc:spChg>
         <pc:picChg chg="add mod">
@@ -250,16 +298,24 @@
           </ac:picMkLst>
         </pc:picChg>
         <pc:picChg chg="add mod">
-          <ac:chgData name="Thad Schwebke" userId="8a3b078b179e4a90" providerId="LiveId" clId="{61374EC2-74A0-4B7E-A59A-1715CE5DD16C}" dt="2020-02-20T19:53:50.087" v="194" actId="1076"/>
+          <ac:chgData name="Thad Schwebke" userId="8a3b078b179e4a90" providerId="LiveId" clId="{61374EC2-74A0-4B7E-A59A-1715CE5DD16C}" dt="2020-02-21T03:11:40.565" v="319" actId="1076"/>
           <ac:picMkLst>
             <pc:docMk/>
             <pc:sldMk cId="2460916010" sldId="262"/>
             <ac:picMk id="5" creationId="{EEC5FDBD-EA7A-4924-8D84-94C46331C6D1}"/>
           </ac:picMkLst>
         </pc:picChg>
+        <pc:picChg chg="add mod">
+          <ac:chgData name="Thad Schwebke" userId="8a3b078b179e4a90" providerId="LiveId" clId="{61374EC2-74A0-4B7E-A59A-1715CE5DD16C}" dt="2020-02-21T03:11:46.304" v="321" actId="1076"/>
+          <ac:picMkLst>
+            <pc:docMk/>
+            <pc:sldMk cId="2460916010" sldId="262"/>
+            <ac:picMk id="6" creationId="{99CA9CC8-D41E-4EC2-9AD9-88EAA1C3F8F8}"/>
+          </ac:picMkLst>
+        </pc:picChg>
       </pc:sldChg>
       <pc:sldChg chg="addSp delSp modSp add">
-        <pc:chgData name="Thad Schwebke" userId="8a3b078b179e4a90" providerId="LiveId" clId="{61374EC2-74A0-4B7E-A59A-1715CE5DD16C}" dt="2020-02-20T19:56:08.121" v="218" actId="1076"/>
+        <pc:chgData name="Thad Schwebke" userId="8a3b078b179e4a90" providerId="LiveId" clId="{61374EC2-74A0-4B7E-A59A-1715CE5DD16C}" dt="2020-02-21T03:18:51.458" v="479" actId="478"/>
         <pc:sldMkLst>
           <pc:docMk/>
           <pc:sldMk cId="1524816342" sldId="263"/>
@@ -280,6 +336,14 @@
             <ac:spMk id="3" creationId="{D29DCA66-FB83-4DFA-97A8-C248E181AC83}"/>
           </ac:spMkLst>
         </pc:spChg>
+        <pc:spChg chg="add mod">
+          <ac:chgData name="Thad Schwebke" userId="8a3b078b179e4a90" providerId="LiveId" clId="{61374EC2-74A0-4B7E-A59A-1715CE5DD16C}" dt="2020-02-21T03:18:22.476" v="475" actId="20577"/>
+          <ac:spMkLst>
+            <pc:docMk/>
+            <pc:sldMk cId="1524816342" sldId="263"/>
+            <ac:spMk id="3" creationId="{E0C1BD30-36F1-4EDD-B318-8835C7630909}"/>
+          </ac:spMkLst>
+        </pc:spChg>
         <pc:picChg chg="add mod">
           <ac:chgData name="Thad Schwebke" userId="8a3b078b179e4a90" providerId="LiveId" clId="{61374EC2-74A0-4B7E-A59A-1715CE5DD16C}" dt="2020-02-20T19:54:59.690" v="203" actId="1076"/>
           <ac:picMkLst>
@@ -288,16 +352,16 @@
             <ac:picMk id="2050" creationId="{6B4D342B-1CE4-42CA-B4E5-AC259B77E274}"/>
           </ac:picMkLst>
         </pc:picChg>
-        <pc:picChg chg="add mod">
-          <ac:chgData name="Thad Schwebke" userId="8a3b078b179e4a90" providerId="LiveId" clId="{61374EC2-74A0-4B7E-A59A-1715CE5DD16C}" dt="2020-02-20T19:56:05.892" v="217" actId="1076"/>
+        <pc:picChg chg="add del mod">
+          <ac:chgData name="Thad Schwebke" userId="8a3b078b179e4a90" providerId="LiveId" clId="{61374EC2-74A0-4B7E-A59A-1715CE5DD16C}" dt="2020-02-21T03:18:49.360" v="478" actId="478"/>
           <ac:picMkLst>
             <pc:docMk/>
             <pc:sldMk cId="1524816342" sldId="263"/>
             <ac:picMk id="2052" creationId="{A89BA44E-8930-4916-8A10-D0C07545B071}"/>
           </ac:picMkLst>
         </pc:picChg>
-        <pc:picChg chg="add mod">
-          <ac:chgData name="Thad Schwebke" userId="8a3b078b179e4a90" providerId="LiveId" clId="{61374EC2-74A0-4B7E-A59A-1715CE5DD16C}" dt="2020-02-20T19:56:08.121" v="218" actId="1076"/>
+        <pc:picChg chg="add del mod">
+          <ac:chgData name="Thad Schwebke" userId="8a3b078b179e4a90" providerId="LiveId" clId="{61374EC2-74A0-4B7E-A59A-1715CE5DD16C}" dt="2020-02-21T03:18:51.458" v="479" actId="478"/>
           <ac:picMkLst>
             <pc:docMk/>
             <pc:sldMk cId="1524816342" sldId="263"/>
@@ -306,7 +370,7 @@
         </pc:picChg>
       </pc:sldChg>
       <pc:sldChg chg="addSp delSp modSp add">
-        <pc:chgData name="Thad Schwebke" userId="8a3b078b179e4a90" providerId="LiveId" clId="{61374EC2-74A0-4B7E-A59A-1715CE5DD16C}" dt="2020-02-20T19:58:11.671" v="259" actId="1076"/>
+        <pc:chgData name="Thad Schwebke" userId="8a3b078b179e4a90" providerId="LiveId" clId="{61374EC2-74A0-4B7E-A59A-1715CE5DD16C}" dt="2020-02-21T03:22:04.314" v="527" actId="1076"/>
         <pc:sldMkLst>
           <pc:docMk/>
           <pc:sldMk cId="2663868610" sldId="264"/>
@@ -327,8 +391,8 @@
             <ac:spMk id="3" creationId="{1B6B94C2-C3E1-443F-9BE4-87A8CD46E4EA}"/>
           </ac:spMkLst>
         </pc:spChg>
-        <pc:spChg chg="add mod">
-          <ac:chgData name="Thad Schwebke" userId="8a3b078b179e4a90" providerId="LiveId" clId="{61374EC2-74A0-4B7E-A59A-1715CE5DD16C}" dt="2020-02-20T19:57:42.546" v="253" actId="1076"/>
+        <pc:spChg chg="add mod ord">
+          <ac:chgData name="Thad Schwebke" userId="8a3b078b179e4a90" providerId="LiveId" clId="{61374EC2-74A0-4B7E-A59A-1715CE5DD16C}" dt="2020-02-21T03:22:04.314" v="527" actId="1076"/>
           <ac:spMkLst>
             <pc:docMk/>
             <pc:sldMk cId="2663868610" sldId="264"/>
@@ -336,7 +400,7 @@
           </ac:spMkLst>
         </pc:spChg>
         <pc:picChg chg="add mod">
-          <ac:chgData name="Thad Schwebke" userId="8a3b078b179e4a90" providerId="LiveId" clId="{61374EC2-74A0-4B7E-A59A-1715CE5DD16C}" dt="2020-02-20T19:57:56.543" v="256" actId="1076"/>
+          <ac:chgData name="Thad Schwebke" userId="8a3b078b179e4a90" providerId="LiveId" clId="{61374EC2-74A0-4B7E-A59A-1715CE5DD16C}" dt="2020-02-21T03:22:01.566" v="526" actId="1076"/>
           <ac:picMkLst>
             <pc:docMk/>
             <pc:sldMk cId="2663868610" sldId="264"/>
@@ -353,7 +417,7 @@
         </pc:picChg>
       </pc:sldChg>
       <pc:sldChg chg="addSp delSp modSp add">
-        <pc:chgData name="Thad Schwebke" userId="8a3b078b179e4a90" providerId="LiveId" clId="{61374EC2-74A0-4B7E-A59A-1715CE5DD16C}" dt="2020-02-20T20:00:11.629" v="279" actId="1076"/>
+        <pc:chgData name="Thad Schwebke" userId="8a3b078b179e4a90" providerId="LiveId" clId="{61374EC2-74A0-4B7E-A59A-1715CE5DD16C}" dt="2020-02-21T03:30:50.215" v="587"/>
         <pc:sldMkLst>
           <pc:docMk/>
           <pc:sldMk cId="245379799" sldId="265"/>
@@ -372,6 +436,14 @@
             <pc:docMk/>
             <pc:sldMk cId="245379799" sldId="265"/>
             <ac:spMk id="3" creationId="{8ED2079A-8CB0-4E3F-B102-92CC89EAFC2D}"/>
+          </ac:spMkLst>
+        </pc:spChg>
+        <pc:spChg chg="add">
+          <ac:chgData name="Thad Schwebke" userId="8a3b078b179e4a90" providerId="LiveId" clId="{61374EC2-74A0-4B7E-A59A-1715CE5DD16C}" dt="2020-02-21T03:30:50.215" v="587"/>
+          <ac:spMkLst>
+            <pc:docMk/>
+            <pc:sldMk cId="245379799" sldId="265"/>
+            <ac:spMk id="5" creationId="{795DAF57-4036-45BE-9C09-2ADDDCF3D3F1}"/>
           </ac:spMkLst>
         </pc:spChg>
         <pc:picChg chg="add del mod">
@@ -408,7 +480,7 @@
         </pc:picChg>
       </pc:sldChg>
       <pc:sldChg chg="addSp delSp modSp add">
-        <pc:chgData name="Thad Schwebke" userId="8a3b078b179e4a90" providerId="LiveId" clId="{61374EC2-74A0-4B7E-A59A-1715CE5DD16C}" dt="2020-02-20T20:02:57.560" v="305" actId="21"/>
+        <pc:chgData name="Thad Schwebke" userId="8a3b078b179e4a90" providerId="LiveId" clId="{61374EC2-74A0-4B7E-A59A-1715CE5DD16C}" dt="2020-02-21T03:40:18.747" v="608" actId="1076"/>
         <pc:sldMkLst>
           <pc:docMk/>
           <pc:sldMk cId="1387322310" sldId="266"/>
@@ -430,7 +502,7 @@
           </ac:spMkLst>
         </pc:spChg>
         <pc:picChg chg="add mod">
-          <ac:chgData name="Thad Schwebke" userId="8a3b078b179e4a90" providerId="LiveId" clId="{61374EC2-74A0-4B7E-A59A-1715CE5DD16C}" dt="2020-02-20T20:00:37.281" v="283" actId="1076"/>
+          <ac:chgData name="Thad Schwebke" userId="8a3b078b179e4a90" providerId="LiveId" clId="{61374EC2-74A0-4B7E-A59A-1715CE5DD16C}" dt="2020-02-21T03:40:16.624" v="607" actId="1076"/>
           <ac:picMkLst>
             <pc:docMk/>
             <pc:sldMk cId="1387322310" sldId="266"/>
@@ -438,7 +510,7 @@
           </ac:picMkLst>
         </pc:picChg>
         <pc:picChg chg="add mod">
-          <ac:chgData name="Thad Schwebke" userId="8a3b078b179e4a90" providerId="LiveId" clId="{61374EC2-74A0-4B7E-A59A-1715CE5DD16C}" dt="2020-02-20T20:02:25.774" v="299" actId="1076"/>
+          <ac:chgData name="Thad Schwebke" userId="8a3b078b179e4a90" providerId="LiveId" clId="{61374EC2-74A0-4B7E-A59A-1715CE5DD16C}" dt="2020-02-21T03:40:18.747" v="608" actId="1076"/>
           <ac:picMkLst>
             <pc:docMk/>
             <pc:sldMk cId="1387322310" sldId="266"/>
@@ -446,23 +518,23 @@
           </ac:picMkLst>
         </pc:picChg>
         <pc:picChg chg="add mod">
-          <ac:chgData name="Thad Schwebke" userId="8a3b078b179e4a90" providerId="LiveId" clId="{61374EC2-74A0-4B7E-A59A-1715CE5DD16C}" dt="2020-02-20T20:01:08.963" v="289" actId="1076"/>
+          <ac:chgData name="Thad Schwebke" userId="8a3b078b179e4a90" providerId="LiveId" clId="{61374EC2-74A0-4B7E-A59A-1715CE5DD16C}" dt="2020-02-21T03:40:14.041" v="606" actId="1076"/>
           <ac:picMkLst>
             <pc:docMk/>
             <pc:sldMk cId="1387322310" sldId="266"/>
             <ac:picMk id="6150" creationId="{51AF7C21-823B-435E-92A3-BF4ED773E3AE}"/>
           </ac:picMkLst>
         </pc:picChg>
-        <pc:picChg chg="add mod">
-          <ac:chgData name="Thad Schwebke" userId="8a3b078b179e4a90" providerId="LiveId" clId="{61374EC2-74A0-4B7E-A59A-1715CE5DD16C}" dt="2020-02-20T20:01:24.500" v="292" actId="1076"/>
+        <pc:picChg chg="add del mod">
+          <ac:chgData name="Thad Schwebke" userId="8a3b078b179e4a90" providerId="LiveId" clId="{61374EC2-74A0-4B7E-A59A-1715CE5DD16C}" dt="2020-02-21T03:39:53.887" v="601" actId="478"/>
           <ac:picMkLst>
             <pc:docMk/>
             <pc:sldMk cId="1387322310" sldId="266"/>
             <ac:picMk id="6152" creationId="{18ED6B64-2B80-43EA-AB33-141AAF2B927F}"/>
           </ac:picMkLst>
         </pc:picChg>
-        <pc:picChg chg="add mod">
-          <ac:chgData name="Thad Schwebke" userId="8a3b078b179e4a90" providerId="LiveId" clId="{61374EC2-74A0-4B7E-A59A-1715CE5DD16C}" dt="2020-02-20T20:02:27.753" v="300" actId="1076"/>
+        <pc:picChg chg="add del mod">
+          <ac:chgData name="Thad Schwebke" userId="8a3b078b179e4a90" providerId="LiveId" clId="{61374EC2-74A0-4B7E-A59A-1715CE5DD16C}" dt="2020-02-21T03:39:55.136" v="602" actId="478"/>
           <ac:picMkLst>
             <pc:docMk/>
             <pc:sldMk cId="1387322310" sldId="266"/>
@@ -487,7 +559,7 @@
         </pc:picChg>
       </pc:sldChg>
       <pc:sldChg chg="addSp delSp modSp add">
-        <pc:chgData name="Thad Schwebke" userId="8a3b078b179e4a90" providerId="LiveId" clId="{61374EC2-74A0-4B7E-A59A-1715CE5DD16C}" dt="2020-02-20T20:04:20.896" v="317" actId="14100"/>
+        <pc:chgData name="Thad Schwebke" userId="8a3b078b179e4a90" providerId="LiveId" clId="{61374EC2-74A0-4B7E-A59A-1715CE5DD16C}" dt="2020-02-21T03:39:46.745" v="600" actId="1076"/>
         <pc:sldMkLst>
           <pc:docMk/>
           <pc:sldMk cId="4003640020" sldId="267"/>
@@ -508,24 +580,24 @@
             <ac:spMk id="3" creationId="{5223D254-6223-4630-B5D3-129B0D1889C4}"/>
           </ac:spMkLst>
         </pc:spChg>
-        <pc:picChg chg="add mod">
-          <ac:chgData name="Thad Schwebke" userId="8a3b078b179e4a90" providerId="LiveId" clId="{61374EC2-74A0-4B7E-A59A-1715CE5DD16C}" dt="2020-02-20T20:03:22.021" v="311" actId="1076"/>
+        <pc:picChg chg="add del mod">
+          <ac:chgData name="Thad Schwebke" userId="8a3b078b179e4a90" providerId="LiveId" clId="{61374EC2-74A0-4B7E-A59A-1715CE5DD16C}" dt="2020-02-21T03:39:42.106" v="598" actId="478"/>
           <ac:picMkLst>
             <pc:docMk/>
             <pc:sldMk cId="4003640020" sldId="267"/>
             <ac:picMk id="4" creationId="{F77260D3-94A3-4A4A-ADAB-DEEE5AC49ED7}"/>
           </ac:picMkLst>
         </pc:picChg>
-        <pc:picChg chg="add mod">
-          <ac:chgData name="Thad Schwebke" userId="8a3b078b179e4a90" providerId="LiveId" clId="{61374EC2-74A0-4B7E-A59A-1715CE5DD16C}" dt="2020-02-20T20:03:23.983" v="312" actId="1076"/>
+        <pc:picChg chg="add del mod">
+          <ac:chgData name="Thad Schwebke" userId="8a3b078b179e4a90" providerId="LiveId" clId="{61374EC2-74A0-4B7E-A59A-1715CE5DD16C}" dt="2020-02-21T03:39:33.872" v="596" actId="478"/>
           <ac:picMkLst>
             <pc:docMk/>
             <pc:sldMk cId="4003640020" sldId="267"/>
             <ac:picMk id="5" creationId="{393656D6-1FBA-42DD-8361-40FE09EB67D0}"/>
           </ac:picMkLst>
         </pc:picChg>
-        <pc:picChg chg="add mod">
-          <ac:chgData name="Thad Schwebke" userId="8a3b078b179e4a90" providerId="LiveId" clId="{61374EC2-74A0-4B7E-A59A-1715CE5DD16C}" dt="2020-02-20T20:03:20.344" v="310" actId="1076"/>
+        <pc:picChg chg="add del mod">
+          <ac:chgData name="Thad Schwebke" userId="8a3b078b179e4a90" providerId="LiveId" clId="{61374EC2-74A0-4B7E-A59A-1715CE5DD16C}" dt="2020-02-21T03:39:29.652" v="595" actId="478"/>
           <ac:picMkLst>
             <pc:docMk/>
             <pc:sldMk cId="4003640020" sldId="267"/>
@@ -533,7 +605,7 @@
           </ac:picMkLst>
         </pc:picChg>
         <pc:picChg chg="add mod">
-          <ac:chgData name="Thad Schwebke" userId="8a3b078b179e4a90" providerId="LiveId" clId="{61374EC2-74A0-4B7E-A59A-1715CE5DD16C}" dt="2020-02-20T20:03:49.873" v="315" actId="1076"/>
+          <ac:chgData name="Thad Schwebke" userId="8a3b078b179e4a90" providerId="LiveId" clId="{61374EC2-74A0-4B7E-A59A-1715CE5DD16C}" dt="2020-02-21T03:39:43.821" v="599" actId="1076"/>
           <ac:picMkLst>
             <pc:docMk/>
             <pc:sldMk cId="4003640020" sldId="267"/>
@@ -541,7 +613,7 @@
           </ac:picMkLst>
         </pc:picChg>
         <pc:picChg chg="add mod">
-          <ac:chgData name="Thad Schwebke" userId="8a3b078b179e4a90" providerId="LiveId" clId="{61374EC2-74A0-4B7E-A59A-1715CE5DD16C}" dt="2020-02-20T20:04:20.896" v="317" actId="14100"/>
+          <ac:chgData name="Thad Schwebke" userId="8a3b078b179e4a90" providerId="LiveId" clId="{61374EC2-74A0-4B7E-A59A-1715CE5DD16C}" dt="2020-02-21T03:39:46.745" v="600" actId="1076"/>
           <ac:picMkLst>
             <pc:docMk/>
             <pc:sldMk cId="4003640020" sldId="267"/>
@@ -549,8 +621,8 @@
           </ac:picMkLst>
         </pc:picChg>
       </pc:sldChg>
-      <pc:sldChg chg="modSp add ord">
-        <pc:chgData name="Thad Schwebke" userId="8a3b078b179e4a90" providerId="LiveId" clId="{61374EC2-74A0-4B7E-A59A-1715CE5DD16C}" dt="2020-02-20T19:59:33.113" v="270"/>
+      <pc:sldChg chg="addSp modSp add ord">
+        <pc:chgData name="Thad Schwebke" userId="8a3b078b179e4a90" providerId="LiveId" clId="{61374EC2-74A0-4B7E-A59A-1715CE5DD16C}" dt="2020-02-21T03:24:46.838" v="586" actId="20577"/>
         <pc:sldMkLst>
           <pc:docMk/>
           <pc:sldMk cId="2005336270" sldId="268"/>
@@ -561,6 +633,14 @@
             <pc:docMk/>
             <pc:sldMk cId="2005336270" sldId="268"/>
             <ac:spMk id="2" creationId="{300BBF5E-404A-4162-BF76-30A21C5CD566}"/>
+          </ac:spMkLst>
+        </pc:spChg>
+        <pc:spChg chg="add mod">
+          <ac:chgData name="Thad Schwebke" userId="8a3b078b179e4a90" providerId="LiveId" clId="{61374EC2-74A0-4B7E-A59A-1715CE5DD16C}" dt="2020-02-21T03:24:46.838" v="586" actId="20577"/>
+          <ac:spMkLst>
+            <pc:docMk/>
+            <pc:sldMk cId="2005336270" sldId="268"/>
+            <ac:spMk id="3" creationId="{158BCD5C-C95C-42D4-A773-75F775D87EE5}"/>
           </ac:spMkLst>
         </pc:spChg>
       </pc:sldChg>
@@ -1081,6 +1161,174 @@
     </a:lvl9pPr>
   </p:notesStyle>
 </p:notesMaster>
+</file>
+
+<file path=ppt/notesSlides/notesSlide1.xml><?xml version="1.0" encoding="utf-8"?>
+<p:notes xmlns:a="http://schemas.openxmlformats.org/drawingml/2006/main" xmlns:r="http://schemas.openxmlformats.org/officeDocument/2006/relationships" xmlns:p="http://schemas.openxmlformats.org/presentationml/2006/main">
+  <p:cSld>
+    <p:spTree>
+      <p:nvGrpSpPr>
+        <p:cNvPr id="1" name=""/>
+        <p:cNvGrpSpPr/>
+        <p:nvPr/>
+      </p:nvGrpSpPr>
+      <p:grpSpPr>
+        <a:xfrm>
+          <a:off x="0" y="0"/>
+          <a:ext cx="0" cy="0"/>
+          <a:chOff x="0" y="0"/>
+          <a:chExt cx="0" cy="0"/>
+        </a:xfrm>
+      </p:grpSpPr>
+      <p:sp>
+        <p:nvSpPr>
+          <p:cNvPr id="2" name="Slide Image Placeholder 1"/>
+          <p:cNvSpPr>
+            <a:spLocks noGrp="1" noRot="1" noChangeAspect="1"/>
+          </p:cNvSpPr>
+          <p:nvPr>
+            <p:ph type="sldImg"/>
+          </p:nvPr>
+        </p:nvSpPr>
+        <p:spPr/>
+      </p:sp>
+      <p:sp>
+        <p:nvSpPr>
+          <p:cNvPr id="3" name="Notes Placeholder 2"/>
+          <p:cNvSpPr>
+            <a:spLocks noGrp="1"/>
+          </p:cNvSpPr>
+          <p:nvPr>
+            <p:ph type="body" idx="1"/>
+          </p:nvPr>
+        </p:nvSpPr>
+        <p:spPr/>
+        <p:txBody>
+          <a:bodyPr/>
+          <a:lstStyle/>
+          <a:p>
+            <a:endParaRPr lang="en-US" dirty="0"/>
+          </a:p>
+        </p:txBody>
+      </p:sp>
+      <p:sp>
+        <p:nvSpPr>
+          <p:cNvPr id="4" name="Slide Number Placeholder 3"/>
+          <p:cNvSpPr>
+            <a:spLocks noGrp="1"/>
+          </p:cNvSpPr>
+          <p:nvPr>
+            <p:ph type="sldNum" sz="quarter" idx="5"/>
+          </p:nvPr>
+        </p:nvSpPr>
+        <p:spPr/>
+        <p:txBody>
+          <a:bodyPr/>
+          <a:lstStyle/>
+          <a:p>
+            <a:fld id="{274AE7AE-FCBF-419F-971E-04B351FA8EC0}" type="slidenum">
+              <a:rPr lang="en-US" smtClean="0"/>
+              <a:t>7</a:t>
+            </a:fld>
+            <a:endParaRPr lang="en-US"/>
+          </a:p>
+        </p:txBody>
+      </p:sp>
+    </p:spTree>
+    <p:extLst>
+      <p:ext uri="{BB962C8B-B14F-4D97-AF65-F5344CB8AC3E}">
+        <p14:creationId xmlns:p14="http://schemas.microsoft.com/office/powerpoint/2010/main" val="3025096371"/>
+      </p:ext>
+    </p:extLst>
+  </p:cSld>
+  <p:clrMapOvr>
+    <a:masterClrMapping/>
+  </p:clrMapOvr>
+</p:notes>
+</file>
+
+<file path=ppt/notesSlides/notesSlide2.xml><?xml version="1.0" encoding="utf-8"?>
+<p:notes xmlns:a="http://schemas.openxmlformats.org/drawingml/2006/main" xmlns:r="http://schemas.openxmlformats.org/officeDocument/2006/relationships" xmlns:p="http://schemas.openxmlformats.org/presentationml/2006/main">
+  <p:cSld>
+    <p:spTree>
+      <p:nvGrpSpPr>
+        <p:cNvPr id="1" name=""/>
+        <p:cNvGrpSpPr/>
+        <p:nvPr/>
+      </p:nvGrpSpPr>
+      <p:grpSpPr>
+        <a:xfrm>
+          <a:off x="0" y="0"/>
+          <a:ext cx="0" cy="0"/>
+          <a:chOff x="0" y="0"/>
+          <a:chExt cx="0" cy="0"/>
+        </a:xfrm>
+      </p:grpSpPr>
+      <p:sp>
+        <p:nvSpPr>
+          <p:cNvPr id="2" name="Slide Image Placeholder 1"/>
+          <p:cNvSpPr>
+            <a:spLocks noGrp="1" noRot="1" noChangeAspect="1"/>
+          </p:cNvSpPr>
+          <p:nvPr>
+            <p:ph type="sldImg"/>
+          </p:nvPr>
+        </p:nvSpPr>
+        <p:spPr/>
+      </p:sp>
+      <p:sp>
+        <p:nvSpPr>
+          <p:cNvPr id="3" name="Notes Placeholder 2"/>
+          <p:cNvSpPr>
+            <a:spLocks noGrp="1"/>
+          </p:cNvSpPr>
+          <p:nvPr>
+            <p:ph type="body" idx="1"/>
+          </p:nvPr>
+        </p:nvSpPr>
+        <p:spPr/>
+        <p:txBody>
+          <a:bodyPr/>
+          <a:lstStyle/>
+          <a:p>
+            <a:endParaRPr lang="en-US" dirty="0"/>
+          </a:p>
+        </p:txBody>
+      </p:sp>
+      <p:sp>
+        <p:nvSpPr>
+          <p:cNvPr id="4" name="Slide Number Placeholder 3"/>
+          <p:cNvSpPr>
+            <a:spLocks noGrp="1"/>
+          </p:cNvSpPr>
+          <p:nvPr>
+            <p:ph type="sldNum" sz="quarter" idx="5"/>
+          </p:nvPr>
+        </p:nvSpPr>
+        <p:spPr/>
+        <p:txBody>
+          <a:bodyPr/>
+          <a:lstStyle/>
+          <a:p>
+            <a:fld id="{274AE7AE-FCBF-419F-971E-04B351FA8EC0}" type="slidenum">
+              <a:rPr lang="en-US" smtClean="0"/>
+              <a:t>13</a:t>
+            </a:fld>
+            <a:endParaRPr lang="en-US"/>
+          </a:p>
+        </p:txBody>
+      </p:sp>
+    </p:spTree>
+    <p:extLst>
+      <p:ext uri="{BB962C8B-B14F-4D97-AF65-F5344CB8AC3E}">
+        <p14:creationId xmlns:p14="http://schemas.microsoft.com/office/powerpoint/2010/main" val="3427665525"/>
+      </p:ext>
+    </p:extLst>
+  </p:cSld>
+  <p:clrMapOvr>
+    <a:masterClrMapping/>
+  </p:clrMapOvr>
+</p:notes>
 </file>
 
 <file path=ppt/slideLayouts/slideLayout1.xml><?xml version="1.0" encoding="utf-8"?>
@@ -19222,6 +19470,46 @@
           </a:extLst>
         </p:spPr>
       </p:pic>
+      <p:sp>
+        <p:nvSpPr>
+          <p:cNvPr id="3" name="TextBox 2">
+            <a:extLst>
+              <a:ext uri="{FF2B5EF4-FFF2-40B4-BE49-F238E27FC236}">
+                <a16:creationId xmlns:a16="http://schemas.microsoft.com/office/drawing/2014/main" id="{158BCD5C-C95C-42D4-A773-75F775D87EE5}"/>
+              </a:ext>
+            </a:extLst>
+          </p:cNvPr>
+          <p:cNvSpPr txBox="1"/>
+          <p:nvPr/>
+        </p:nvSpPr>
+        <p:spPr>
+          <a:xfrm>
+            <a:off x="228600" y="361950"/>
+            <a:ext cx="1981200" cy="646331"/>
+          </a:xfrm>
+          <a:prstGeom prst="rect">
+            <a:avLst/>
+          </a:prstGeom>
+          <a:noFill/>
+        </p:spPr>
+        <p:txBody>
+          <a:bodyPr wrap="square" rtlCol="0">
+            <a:spAutoFit/>
+          </a:bodyPr>
+          <a:lstStyle/>
+          <a:p>
+            <a:r>
+              <a:rPr lang="en-US" dirty="0"/>
+              <a:t>Change states to </a:t>
+            </a:r>
+            <a:r>
+              <a:rPr lang="en-US" dirty="0" err="1"/>
+              <a:t>treemap</a:t>
+            </a:r>
+            <a:endParaRPr lang="en-US" dirty="0"/>
+          </a:p>
+        </p:txBody>
+      </p:sp>
     </p:spTree>
     <p:extLst>
       <p:ext uri="{BB962C8B-B14F-4D97-AF65-F5344CB8AC3E}">
@@ -19374,6 +19662,46 @@
           </a:extLst>
         </p:spPr>
       </p:pic>
+      <p:sp>
+        <p:nvSpPr>
+          <p:cNvPr id="5" name="TextBox 4">
+            <a:extLst>
+              <a:ext uri="{FF2B5EF4-FFF2-40B4-BE49-F238E27FC236}">
+                <a16:creationId xmlns:a16="http://schemas.microsoft.com/office/drawing/2014/main" id="{795DAF57-4036-45BE-9C09-2ADDDCF3D3F1}"/>
+              </a:ext>
+            </a:extLst>
+          </p:cNvPr>
+          <p:cNvSpPr txBox="1"/>
+          <p:nvPr/>
+        </p:nvSpPr>
+        <p:spPr>
+          <a:xfrm>
+            <a:off x="228600" y="361950"/>
+            <a:ext cx="1981200" cy="646331"/>
+          </a:xfrm>
+          <a:prstGeom prst="rect">
+            <a:avLst/>
+          </a:prstGeom>
+          <a:noFill/>
+        </p:spPr>
+        <p:txBody>
+          <a:bodyPr wrap="square" rtlCol="0">
+            <a:spAutoFit/>
+          </a:bodyPr>
+          <a:lstStyle/>
+          <a:p>
+            <a:r>
+              <a:rPr lang="en-US" dirty="0"/>
+              <a:t>Change states to </a:t>
+            </a:r>
+            <a:r>
+              <a:rPr lang="en-US" dirty="0" err="1"/>
+              <a:t>treemap</a:t>
+            </a:r>
+            <a:endParaRPr lang="en-US" dirty="0"/>
+          </a:p>
+        </p:txBody>
+      </p:sp>
     </p:spTree>
     <p:extLst>
       <p:ext uri="{BB962C8B-B14F-4D97-AF65-F5344CB8AC3E}">
@@ -19461,7 +19789,7 @@
         </p:blipFill>
         <p:spPr bwMode="auto">
           <a:xfrm>
-            <a:off x="152400" y="971550"/>
+            <a:off x="2895600" y="1123950"/>
             <a:ext cx="3657600" cy="2612571"/>
           </a:xfrm>
           <a:prstGeom prst="rect">
@@ -19508,7 +19836,7 @@
         </p:blipFill>
         <p:spPr bwMode="auto">
           <a:xfrm>
-            <a:off x="3254005" y="722022"/>
+            <a:off x="6172200" y="1102625"/>
             <a:ext cx="3657600" cy="2612571"/>
           </a:xfrm>
           <a:prstGeom prst="rect">
@@ -19555,101 +19883,7 @@
         </p:blipFill>
         <p:spPr bwMode="auto">
           <a:xfrm>
-            <a:off x="533400" y="2419350"/>
-            <a:ext cx="3657600" cy="2612571"/>
-          </a:xfrm>
-          <a:prstGeom prst="rect">
-            <a:avLst/>
-          </a:prstGeom>
-          <a:noFill/>
-          <a:extLst>
-            <a:ext uri="{909E8E84-426E-40DD-AFC4-6F175D3DCCD1}">
-              <a14:hiddenFill xmlns:a14="http://schemas.microsoft.com/office/drawing/2010/main">
-                <a:solidFill>
-                  <a:srgbClr val="FFFFFF"/>
-                </a:solidFill>
-              </a14:hiddenFill>
-            </a:ext>
-          </a:extLst>
-        </p:spPr>
-      </p:pic>
-      <p:pic>
-        <p:nvPicPr>
-          <p:cNvPr id="6152" name="Picture 8">
-            <a:extLst>
-              <a:ext uri="{FF2B5EF4-FFF2-40B4-BE49-F238E27FC236}">
-                <a16:creationId xmlns:a16="http://schemas.microsoft.com/office/drawing/2014/main" id="{18ED6B64-2B80-43EA-AB33-141AAF2B927F}"/>
-              </a:ext>
-            </a:extLst>
-          </p:cNvPr>
-          <p:cNvPicPr>
-            <a:picLocks noChangeAspect="1" noChangeArrowheads="1"/>
-          </p:cNvPicPr>
-          <p:nvPr/>
-        </p:nvPicPr>
-        <p:blipFill>
-          <a:blip r:embed="rId5">
-            <a:extLst>
-              <a:ext uri="{28A0092B-C50C-407E-A947-70E740481C1C}">
-                <a14:useLocalDpi xmlns:a14="http://schemas.microsoft.com/office/drawing/2010/main" val="0"/>
-              </a:ext>
-            </a:extLst>
-          </a:blip>
-          <a:srcRect/>
-          <a:stretch>
-            <a:fillRect/>
-          </a:stretch>
-        </p:blipFill>
-        <p:spPr bwMode="auto">
-          <a:xfrm>
-            <a:off x="3048000" y="2533425"/>
-            <a:ext cx="3657600" cy="2612571"/>
-          </a:xfrm>
-          <a:prstGeom prst="rect">
-            <a:avLst/>
-          </a:prstGeom>
-          <a:noFill/>
-          <a:extLst>
-            <a:ext uri="{909E8E84-426E-40DD-AFC4-6F175D3DCCD1}">
-              <a14:hiddenFill xmlns:a14="http://schemas.microsoft.com/office/drawing/2010/main">
-                <a:solidFill>
-                  <a:srgbClr val="FFFFFF"/>
-                </a:solidFill>
-              </a14:hiddenFill>
-            </a:ext>
-          </a:extLst>
-        </p:spPr>
-      </p:pic>
-      <p:pic>
-        <p:nvPicPr>
-          <p:cNvPr id="6154" name="Picture 10">
-            <a:extLst>
-              <a:ext uri="{FF2B5EF4-FFF2-40B4-BE49-F238E27FC236}">
-                <a16:creationId xmlns:a16="http://schemas.microsoft.com/office/drawing/2014/main" id="{C8CC0FFF-20BC-46E8-AF23-CDE7DAD2C5C7}"/>
-              </a:ext>
-            </a:extLst>
-          </p:cNvPr>
-          <p:cNvPicPr>
-            <a:picLocks noChangeAspect="1" noChangeArrowheads="1"/>
-          </p:cNvPicPr>
-          <p:nvPr/>
-        </p:nvPicPr>
-        <p:blipFill>
-          <a:blip r:embed="rId6">
-            <a:extLst>
-              <a:ext uri="{28A0092B-C50C-407E-A947-70E740481C1C}">
-                <a14:useLocalDpi xmlns:a14="http://schemas.microsoft.com/office/drawing/2010/main" val="0"/>
-              </a:ext>
-            </a:extLst>
-          </a:blip>
-          <a:srcRect/>
-          <a:stretch>
-            <a:fillRect/>
-          </a:stretch>
-        </p:blipFill>
-        <p:spPr bwMode="auto">
-          <a:xfrm>
-            <a:off x="3935598" y="1603898"/>
+            <a:off x="-533400" y="1123950"/>
             <a:ext cx="3657600" cy="2612571"/>
           </a:xfrm>
           <a:prstGeom prst="rect">
@@ -19727,57 +19961,10 @@
       </p:sp>
       <p:pic>
         <p:nvPicPr>
-          <p:cNvPr id="4" name="Picture 12">
+          <p:cNvPr id="7172" name="Picture 4">
             <a:extLst>
               <a:ext uri="{FF2B5EF4-FFF2-40B4-BE49-F238E27FC236}">
-                <a16:creationId xmlns:a16="http://schemas.microsoft.com/office/drawing/2014/main" id="{F77260D3-94A3-4A4A-ADAB-DEEE5AC49ED7}"/>
-              </a:ext>
-            </a:extLst>
-          </p:cNvPr>
-          <p:cNvPicPr>
-            <a:picLocks noChangeAspect="1" noChangeArrowheads="1"/>
-          </p:cNvPicPr>
-          <p:nvPr/>
-        </p:nvPicPr>
-        <p:blipFill>
-          <a:blip r:embed="rId2">
-            <a:extLst>
-              <a:ext uri="{28A0092B-C50C-407E-A947-70E740481C1C}">
-                <a14:useLocalDpi xmlns:a14="http://schemas.microsoft.com/office/drawing/2010/main" val="0"/>
-              </a:ext>
-            </a:extLst>
-          </a:blip>
-          <a:srcRect/>
-          <a:stretch>
-            <a:fillRect/>
-          </a:stretch>
-        </p:blipFill>
-        <p:spPr bwMode="auto">
-          <a:xfrm>
-            <a:off x="2578189" y="2356351"/>
-            <a:ext cx="3657600" cy="2612571"/>
-          </a:xfrm>
-          <a:prstGeom prst="rect">
-            <a:avLst/>
-          </a:prstGeom>
-          <a:noFill/>
-          <a:extLst>
-            <a:ext uri="{909E8E84-426E-40DD-AFC4-6F175D3DCCD1}">
-              <a14:hiddenFill xmlns:a14="http://schemas.microsoft.com/office/drawing/2010/main">
-                <a:solidFill>
-                  <a:srgbClr val="FFFFFF"/>
-                </a:solidFill>
-              </a14:hiddenFill>
-            </a:ext>
-          </a:extLst>
-        </p:spPr>
-      </p:pic>
-      <p:pic>
-        <p:nvPicPr>
-          <p:cNvPr id="5" name="Picture 14">
-            <a:extLst>
-              <a:ext uri="{FF2B5EF4-FFF2-40B4-BE49-F238E27FC236}">
-                <a16:creationId xmlns:a16="http://schemas.microsoft.com/office/drawing/2014/main" id="{393656D6-1FBA-42DD-8361-40FE09EB67D0}"/>
+                <a16:creationId xmlns:a16="http://schemas.microsoft.com/office/drawing/2014/main" id="{777ECB40-D891-4E83-BE68-2E0CF9FE5CD9}"/>
               </a:ext>
             </a:extLst>
           </p:cNvPr>
@@ -19801,101 +19988,7 @@
         </p:blipFill>
         <p:spPr bwMode="auto">
           <a:xfrm>
-            <a:off x="5867400" y="1123950"/>
-            <a:ext cx="3657600" cy="2612571"/>
-          </a:xfrm>
-          <a:prstGeom prst="rect">
-            <a:avLst/>
-          </a:prstGeom>
-          <a:noFill/>
-          <a:extLst>
-            <a:ext uri="{909E8E84-426E-40DD-AFC4-6F175D3DCCD1}">
-              <a14:hiddenFill xmlns:a14="http://schemas.microsoft.com/office/drawing/2010/main">
-                <a:solidFill>
-                  <a:srgbClr val="FFFFFF"/>
-                </a:solidFill>
-              </a14:hiddenFill>
-            </a:ext>
-          </a:extLst>
-        </p:spPr>
-      </p:pic>
-      <p:pic>
-        <p:nvPicPr>
-          <p:cNvPr id="7170" name="Picture 2">
-            <a:extLst>
-              <a:ext uri="{FF2B5EF4-FFF2-40B4-BE49-F238E27FC236}">
-                <a16:creationId xmlns:a16="http://schemas.microsoft.com/office/drawing/2014/main" id="{BBAD26E0-A698-4AAD-A69E-7F36F696A625}"/>
-              </a:ext>
-            </a:extLst>
-          </p:cNvPr>
-          <p:cNvPicPr>
-            <a:picLocks noChangeAspect="1" noChangeArrowheads="1"/>
-          </p:cNvPicPr>
-          <p:nvPr/>
-        </p:nvPicPr>
-        <p:blipFill>
-          <a:blip r:embed="rId4">
-            <a:extLst>
-              <a:ext uri="{28A0092B-C50C-407E-A947-70E740481C1C}">
-                <a14:useLocalDpi xmlns:a14="http://schemas.microsoft.com/office/drawing/2010/main" val="0"/>
-              </a:ext>
-            </a:extLst>
-          </a:blip>
-          <a:srcRect/>
-          <a:stretch>
-            <a:fillRect/>
-          </a:stretch>
-        </p:blipFill>
-        <p:spPr bwMode="auto">
-          <a:xfrm>
-            <a:off x="255140" y="1428750"/>
-            <a:ext cx="3657600" cy="2612571"/>
-          </a:xfrm>
-          <a:prstGeom prst="rect">
-            <a:avLst/>
-          </a:prstGeom>
-          <a:noFill/>
-          <a:extLst>
-            <a:ext uri="{909E8E84-426E-40DD-AFC4-6F175D3DCCD1}">
-              <a14:hiddenFill xmlns:a14="http://schemas.microsoft.com/office/drawing/2010/main">
-                <a:solidFill>
-                  <a:srgbClr val="FFFFFF"/>
-                </a:solidFill>
-              </a14:hiddenFill>
-            </a:ext>
-          </a:extLst>
-        </p:spPr>
-      </p:pic>
-      <p:pic>
-        <p:nvPicPr>
-          <p:cNvPr id="7172" name="Picture 4">
-            <a:extLst>
-              <a:ext uri="{FF2B5EF4-FFF2-40B4-BE49-F238E27FC236}">
-                <a16:creationId xmlns:a16="http://schemas.microsoft.com/office/drawing/2014/main" id="{777ECB40-D891-4E83-BE68-2E0CF9FE5CD9}"/>
-              </a:ext>
-            </a:extLst>
-          </p:cNvPr>
-          <p:cNvPicPr>
-            <a:picLocks noChangeAspect="1" noChangeArrowheads="1"/>
-          </p:cNvPicPr>
-          <p:nvPr/>
-        </p:nvPicPr>
-        <p:blipFill>
-          <a:blip r:embed="rId5">
-            <a:extLst>
-              <a:ext uri="{28A0092B-C50C-407E-A947-70E740481C1C}">
-                <a14:useLocalDpi xmlns:a14="http://schemas.microsoft.com/office/drawing/2010/main" val="0"/>
-              </a:ext>
-            </a:extLst>
-          </a:blip>
-          <a:srcRect/>
-          <a:stretch>
-            <a:fillRect/>
-          </a:stretch>
-        </p:blipFill>
-        <p:spPr bwMode="auto">
-          <a:xfrm>
-            <a:off x="5231260" y="2876550"/>
+            <a:off x="4953000" y="1352550"/>
             <a:ext cx="3657600" cy="2612571"/>
           </a:xfrm>
           <a:prstGeom prst="rect">
@@ -19928,7 +20021,7 @@
           <p:nvPr/>
         </p:nvPicPr>
         <p:blipFill>
-          <a:blip r:embed="rId6">
+          <a:blip r:embed="rId4">
             <a:extLst>
               <a:ext uri="{28A0092B-C50C-407E-A947-70E740481C1C}">
                 <a14:useLocalDpi xmlns:a14="http://schemas.microsoft.com/office/drawing/2010/main" val="0"/>
@@ -19942,7 +20035,7 @@
         </p:blipFill>
         <p:spPr bwMode="auto">
           <a:xfrm>
-            <a:off x="971550" y="1"/>
+            <a:off x="685800" y="1382465"/>
             <a:ext cx="3657600" cy="2612571"/>
           </a:xfrm>
           <a:prstGeom prst="rect">
@@ -20537,7 +20630,7 @@
         </p:blipFill>
         <p:spPr bwMode="auto">
           <a:xfrm>
-            <a:off x="533400" y="1051010"/>
+            <a:off x="381000" y="1226148"/>
             <a:ext cx="3657600" cy="2612571"/>
           </a:xfrm>
           <a:prstGeom prst="rect">
@@ -20602,6 +20695,49 @@
           </a:extLst>
         </p:spPr>
       </p:pic>
+      <p:sp>
+        <p:nvSpPr>
+          <p:cNvPr id="5" name="TextBox 4">
+            <a:extLst>
+              <a:ext uri="{FF2B5EF4-FFF2-40B4-BE49-F238E27FC236}">
+                <a16:creationId xmlns:a16="http://schemas.microsoft.com/office/drawing/2014/main" id="{FD335EB1-3900-4747-9EEA-41A3AF0CFA02}"/>
+              </a:ext>
+            </a:extLst>
+          </p:cNvPr>
+          <p:cNvSpPr txBox="1"/>
+          <p:nvPr/>
+        </p:nvSpPr>
+        <p:spPr>
+          <a:xfrm>
+            <a:off x="0" y="311437"/>
+            <a:ext cx="1600200" cy="646331"/>
+          </a:xfrm>
+          <a:prstGeom prst="rect">
+            <a:avLst/>
+          </a:prstGeom>
+          <a:noFill/>
+        </p:spPr>
+        <p:txBody>
+          <a:bodyPr wrap="square" rtlCol="0">
+            <a:spAutoFit/>
+          </a:bodyPr>
+          <a:lstStyle/>
+          <a:p>
+            <a:r>
+              <a:rPr lang="en-US" dirty="0"/>
+              <a:t>Use terrain </a:t>
+            </a:r>
+            <a:r>
+              <a:rPr lang="en-US" dirty="0" err="1"/>
+              <a:t>ggplot</a:t>
+            </a:r>
+            <a:r>
+              <a:rPr lang="en-US" dirty="0"/>
+              <a:t> theme</a:t>
+            </a:r>
+          </a:p>
+        </p:txBody>
+      </p:sp>
     </p:spTree>
     <p:extLst>
       <p:ext uri="{BB962C8B-B14F-4D97-AF65-F5344CB8AC3E}">
@@ -20675,7 +20811,7 @@
           <p:nvPr/>
         </p:nvPicPr>
         <p:blipFill>
-          <a:blip r:embed="rId2"/>
+          <a:blip r:embed="rId3"/>
           <a:stretch>
             <a:fillRect/>
           </a:stretch>
@@ -20705,14 +20841,14 @@
           <p:nvPr/>
         </p:nvPicPr>
         <p:blipFill>
-          <a:blip r:embed="rId3"/>
+          <a:blip r:embed="rId4"/>
           <a:stretch>
             <a:fillRect/>
           </a:stretch>
         </p:blipFill>
         <p:spPr>
           <a:xfrm>
-            <a:off x="183614" y="2697718"/>
+            <a:off x="4114800" y="1063228"/>
             <a:ext cx="5755946" cy="1554480"/>
           </a:xfrm>
           <a:prstGeom prst="rect">
@@ -20720,6 +20856,106 @@
           </a:prstGeom>
         </p:spPr>
       </p:pic>
+      <p:pic>
+        <p:nvPicPr>
+          <p:cNvPr id="6" name="Picture 5">
+            <a:extLst>
+              <a:ext uri="{FF2B5EF4-FFF2-40B4-BE49-F238E27FC236}">
+                <a16:creationId xmlns:a16="http://schemas.microsoft.com/office/drawing/2014/main" id="{99CA9CC8-D41E-4EC2-9AD9-88EAA1C3F8F8}"/>
+              </a:ext>
+            </a:extLst>
+          </p:cNvPr>
+          <p:cNvPicPr>
+            <a:picLocks noChangeAspect="1"/>
+          </p:cNvPicPr>
+          <p:nvPr/>
+        </p:nvPicPr>
+        <p:blipFill>
+          <a:blip r:embed="rId4"/>
+          <a:stretch>
+            <a:fillRect/>
+          </a:stretch>
+        </p:blipFill>
+        <p:spPr>
+          <a:xfrm>
+            <a:off x="1905000" y="3028950"/>
+            <a:ext cx="5755946" cy="1554480"/>
+          </a:xfrm>
+          <a:prstGeom prst="rect">
+            <a:avLst/>
+          </a:prstGeom>
+        </p:spPr>
+      </p:pic>
+      <p:sp>
+        <p:nvSpPr>
+          <p:cNvPr id="9" name="TextBox 8">
+            <a:extLst>
+              <a:ext uri="{FF2B5EF4-FFF2-40B4-BE49-F238E27FC236}">
+                <a16:creationId xmlns:a16="http://schemas.microsoft.com/office/drawing/2014/main" id="{9DAB8808-38A7-46F2-B73D-F269E6BEEAC4}"/>
+              </a:ext>
+            </a:extLst>
+          </p:cNvPr>
+          <p:cNvSpPr txBox="1"/>
+          <p:nvPr/>
+        </p:nvSpPr>
+        <p:spPr>
+          <a:xfrm>
+            <a:off x="228600" y="2800350"/>
+            <a:ext cx="1371600" cy="1477328"/>
+          </a:xfrm>
+          <a:prstGeom prst="rect">
+            <a:avLst/>
+          </a:prstGeom>
+          <a:noFill/>
+        </p:spPr>
+        <p:txBody>
+          <a:bodyPr wrap="square" rtlCol="0">
+            <a:spAutoFit/>
+          </a:bodyPr>
+          <a:lstStyle/>
+          <a:p>
+            <a:r>
+              <a:rPr lang="en-US" dirty="0"/>
+              <a:t>Insert single joined arrow that simulates the merge</a:t>
+            </a:r>
+          </a:p>
+        </p:txBody>
+      </p:sp>
+      <p:sp>
+        <p:nvSpPr>
+          <p:cNvPr id="10" name="TextBox 9">
+            <a:extLst>
+              <a:ext uri="{FF2B5EF4-FFF2-40B4-BE49-F238E27FC236}">
+                <a16:creationId xmlns:a16="http://schemas.microsoft.com/office/drawing/2014/main" id="{A973A35B-416D-479B-8384-685CCE1BDDDC}"/>
+              </a:ext>
+            </a:extLst>
+          </p:cNvPr>
+          <p:cNvSpPr txBox="1"/>
+          <p:nvPr/>
+        </p:nvSpPr>
+        <p:spPr>
+          <a:xfrm>
+            <a:off x="-266700" y="-11089"/>
+            <a:ext cx="1600200" cy="1200329"/>
+          </a:xfrm>
+          <a:prstGeom prst="rect">
+            <a:avLst/>
+          </a:prstGeom>
+          <a:noFill/>
+        </p:spPr>
+        <p:txBody>
+          <a:bodyPr wrap="square" rtlCol="0">
+            <a:spAutoFit/>
+          </a:bodyPr>
+          <a:lstStyle/>
+          <a:p>
+            <a:r>
+              <a:rPr lang="en-US" dirty="0"/>
+              <a:t>Send presentation AI tutor to team</a:t>
+            </a:r>
+          </a:p>
+        </p:txBody>
+      </p:sp>
     </p:spTree>
     <p:extLst>
       <p:ext uri="{BB962C8B-B14F-4D97-AF65-F5344CB8AC3E}">
@@ -20825,96 +21061,41 @@
           </a:extLst>
         </p:spPr>
       </p:pic>
-      <p:pic>
-        <p:nvPicPr>
-          <p:cNvPr id="2052" name="Picture 4">
+      <p:sp>
+        <p:nvSpPr>
+          <p:cNvPr id="3" name="TextBox 2">
             <a:extLst>
               <a:ext uri="{FF2B5EF4-FFF2-40B4-BE49-F238E27FC236}">
-                <a16:creationId xmlns:a16="http://schemas.microsoft.com/office/drawing/2014/main" id="{A89BA44E-8930-4916-8A10-D0C07545B071}"/>
+                <a16:creationId xmlns:a16="http://schemas.microsoft.com/office/drawing/2014/main" id="{E0C1BD30-36F1-4EDD-B318-8835C7630909}"/>
               </a:ext>
             </a:extLst>
           </p:cNvPr>
-          <p:cNvPicPr>
-            <a:picLocks noChangeAspect="1" noChangeArrowheads="1"/>
-          </p:cNvPicPr>
+          <p:cNvSpPr txBox="1"/>
           <p:nvPr/>
-        </p:nvPicPr>
-        <p:blipFill rotWithShape="1">
-          <a:blip r:embed="rId3">
-            <a:extLst>
-              <a:ext uri="{28A0092B-C50C-407E-A947-70E740481C1C}">
-                <a14:useLocalDpi xmlns:a14="http://schemas.microsoft.com/office/drawing/2010/main" val="0"/>
-              </a:ext>
-            </a:extLst>
-          </a:blip>
-          <a:srcRect l="45410"/>
-          <a:stretch/>
-        </p:blipFill>
-        <p:spPr bwMode="auto">
-          <a:xfrm rot="5400000">
-            <a:off x="4043999" y="755281"/>
-            <a:ext cx="1996677" cy="2612571"/>
+        </p:nvSpPr>
+        <p:spPr>
+          <a:xfrm>
+            <a:off x="4307552" y="1504950"/>
+            <a:ext cx="1712248" cy="923330"/>
           </a:xfrm>
           <a:prstGeom prst="rect">
             <a:avLst/>
           </a:prstGeom>
           <a:noFill/>
-          <a:extLst>
-            <a:ext uri="{909E8E84-426E-40DD-AFC4-6F175D3DCCD1}">
-              <a14:hiddenFill xmlns:a14="http://schemas.microsoft.com/office/drawing/2010/main">
-                <a:solidFill>
-                  <a:srgbClr val="FFFFFF"/>
-                </a:solidFill>
-              </a14:hiddenFill>
-            </a:ext>
-          </a:extLst>
         </p:spPr>
-      </p:pic>
-      <p:pic>
-        <p:nvPicPr>
-          <p:cNvPr id="2054" name="Picture 6">
-            <a:extLst>
-              <a:ext uri="{FF2B5EF4-FFF2-40B4-BE49-F238E27FC236}">
-                <a16:creationId xmlns:a16="http://schemas.microsoft.com/office/drawing/2014/main" id="{5C03E47F-4871-4A2E-89CF-8DFD8B87C3C8}"/>
-              </a:ext>
-            </a:extLst>
-          </p:cNvPr>
-          <p:cNvPicPr>
-            <a:picLocks noChangeAspect="1" noChangeArrowheads="1"/>
-          </p:cNvPicPr>
-          <p:nvPr/>
-        </p:nvPicPr>
-        <p:blipFill rotWithShape="1">
-          <a:blip r:embed="rId4">
-            <a:extLst>
-              <a:ext uri="{28A0092B-C50C-407E-A947-70E740481C1C}">
-                <a14:useLocalDpi xmlns:a14="http://schemas.microsoft.com/office/drawing/2010/main" val="0"/>
-              </a:ext>
-            </a:extLst>
-          </a:blip>
-          <a:srcRect l="47493"/>
-          <a:stretch/>
-        </p:blipFill>
-        <p:spPr bwMode="auto">
-          <a:xfrm rot="5400000">
-            <a:off x="6716216" y="701703"/>
-            <a:ext cx="1920476" cy="2612571"/>
-          </a:xfrm>
-          <a:prstGeom prst="rect">
-            <a:avLst/>
-          </a:prstGeom>
-          <a:noFill/>
-          <a:extLst>
-            <a:ext uri="{909E8E84-426E-40DD-AFC4-6F175D3DCCD1}">
-              <a14:hiddenFill xmlns:a14="http://schemas.microsoft.com/office/drawing/2010/main">
-                <a:solidFill>
-                  <a:srgbClr val="FFFFFF"/>
-                </a:solidFill>
-              </a14:hiddenFill>
-            </a:ext>
-          </a:extLst>
-        </p:spPr>
-      </p:pic>
+        <p:txBody>
+          <a:bodyPr wrap="square" rtlCol="0">
+            <a:spAutoFit/>
+          </a:bodyPr>
+          <a:lstStyle/>
+          <a:p>
+            <a:r>
+              <a:rPr lang="en-US" dirty="0"/>
+              <a:t>Do a before and after for missing values</a:t>
+            </a:r>
+          </a:p>
+        </p:txBody>
+      </p:sp>
     </p:spTree>
     <p:extLst>
       <p:ext uri="{BB962C8B-B14F-4D97-AF65-F5344CB8AC3E}">
@@ -20973,41 +21154,6 @@
           </a:p>
         </p:txBody>
       </p:sp>
-      <p:sp>
-        <p:nvSpPr>
-          <p:cNvPr id="4" name="TextBox 3">
-            <a:extLst>
-              <a:ext uri="{FF2B5EF4-FFF2-40B4-BE49-F238E27FC236}">
-                <a16:creationId xmlns:a16="http://schemas.microsoft.com/office/drawing/2014/main" id="{1040D74A-13E6-4708-89E3-2D0C88DEC3FD}"/>
-              </a:ext>
-            </a:extLst>
-          </p:cNvPr>
-          <p:cNvSpPr txBox="1"/>
-          <p:nvPr/>
-        </p:nvSpPr>
-        <p:spPr>
-          <a:xfrm>
-            <a:off x="0" y="133350"/>
-            <a:ext cx="3352800" cy="369332"/>
-          </a:xfrm>
-          <a:prstGeom prst="rect">
-            <a:avLst/>
-          </a:prstGeom>
-          <a:noFill/>
-        </p:spPr>
-        <p:txBody>
-          <a:bodyPr wrap="square" rtlCol="0">
-            <a:spAutoFit/>
-          </a:bodyPr>
-          <a:lstStyle/>
-          <a:p>
-            <a:r>
-              <a:rPr lang="en-US" dirty="0"/>
-              <a:t>Need to change to bar chart</a:t>
-            </a:r>
-          </a:p>
-        </p:txBody>
-      </p:sp>
       <p:pic>
         <p:nvPicPr>
           <p:cNvPr id="3074" name="Picture 2">
@@ -21037,7 +21183,7 @@
         </p:blipFill>
         <p:spPr bwMode="auto">
           <a:xfrm>
-            <a:off x="152400" y="1276350"/>
+            <a:off x="76200" y="1552383"/>
             <a:ext cx="3657600" cy="2612571"/>
           </a:xfrm>
           <a:prstGeom prst="rect">
@@ -21102,6 +21248,41 @@
           </a:extLst>
         </p:spPr>
       </p:pic>
+      <p:sp>
+        <p:nvSpPr>
+          <p:cNvPr id="4" name="TextBox 3">
+            <a:extLst>
+              <a:ext uri="{FF2B5EF4-FFF2-40B4-BE49-F238E27FC236}">
+                <a16:creationId xmlns:a16="http://schemas.microsoft.com/office/drawing/2014/main" id="{1040D74A-13E6-4708-89E3-2D0C88DEC3FD}"/>
+              </a:ext>
+            </a:extLst>
+          </p:cNvPr>
+          <p:cNvSpPr txBox="1"/>
+          <p:nvPr/>
+        </p:nvSpPr>
+        <p:spPr>
+          <a:xfrm>
+            <a:off x="684663" y="1120987"/>
+            <a:ext cx="7162800" cy="369332"/>
+          </a:xfrm>
+          <a:prstGeom prst="rect">
+            <a:avLst/>
+          </a:prstGeom>
+          <a:noFill/>
+        </p:spPr>
+        <p:txBody>
+          <a:bodyPr wrap="square" rtlCol="0">
+            <a:spAutoFit/>
+          </a:bodyPr>
+          <a:lstStyle/>
+          <a:p>
+            <a:r>
+              <a:rPr lang="en-US" dirty="0"/>
+              <a:t>Need to change to bar chart (top and bottom 10) and leave heat maps</a:t>
+            </a:r>
+          </a:p>
+        </p:txBody>
+      </p:sp>
     </p:spTree>
     <p:extLst>
       <p:ext uri="{BB962C8B-B14F-4D97-AF65-F5344CB8AC3E}">

</xml_diff>

<commit_message>
Group Project deck Final
</commit_message>
<xml_diff>
--- a/DS6306 Group Project 1.pptx
+++ b/DS6306 Group Project 1.pptx
@@ -15,8 +15,8 @@
     <p:sldId id="272" r:id="rId3"/>
     <p:sldId id="271" r:id="rId4"/>
     <p:sldId id="263" r:id="rId5"/>
-    <p:sldId id="262" r:id="rId6"/>
-    <p:sldId id="261" r:id="rId7"/>
+    <p:sldId id="274" r:id="rId6"/>
+    <p:sldId id="275" r:id="rId7"/>
     <p:sldId id="264" r:id="rId8"/>
     <p:sldId id="268" r:id="rId9"/>
     <p:sldId id="265" r:id="rId10"/>
@@ -157,8 +157,7 @@
 <file path=ppt/revisionInfo.xml><?xml version="1.0" encoding="utf-8"?>
 <p1510:revInfo xmlns:a="http://schemas.openxmlformats.org/drawingml/2006/main" xmlns:r="http://schemas.openxmlformats.org/officeDocument/2006/relationships" xmlns:p1510="http://schemas.microsoft.com/office/powerpoint/2015/10/main">
   <p1510:revLst>
-    <p1510:client id="{0FBDB5B2-C375-467E-96F5-E579F69E02D0}" v="18" dt="2020-02-23T01:52:55.695"/>
-    <p1510:client id="{61374EC2-74A0-4B7E-A59A-1715CE5DD16C}" v="347" dt="2020-02-22T02:55:21.222"/>
+    <p1510:client id="{0FBDB5B2-C375-467E-96F5-E579F69E02D0}" v="25" dt="2020-02-23T21:49:57.576"/>
   </p1510:revLst>
 </p1510:revInfo>
 </file>
@@ -1022,8 +1021,8 @@
   </pc:docChgLst>
   <pc:docChgLst>
     <pc:chgData name="Thad Schwebke" userId="8a3b078b179e4a90" providerId="LiveId" clId="{0FBDB5B2-C375-467E-96F5-E579F69E02D0}"/>
-    <pc:docChg chg="custSel addSld modSld sldOrd">
-      <pc:chgData name="Thad Schwebke" userId="8a3b078b179e4a90" providerId="LiveId" clId="{0FBDB5B2-C375-467E-96F5-E579F69E02D0}" dt="2020-02-23T01:53:31.835" v="161" actId="1037"/>
+    <pc:docChg chg="custSel addSld delSld modSld sldOrd">
+      <pc:chgData name="Thad Schwebke" userId="8a3b078b179e4a90" providerId="LiveId" clId="{0FBDB5B2-C375-467E-96F5-E579F69E02D0}" dt="2020-02-23T21:50:37.299" v="165" actId="478"/>
       <pc:docMkLst>
         <pc:docMk/>
       </pc:docMkLst>
@@ -1042,15 +1041,15 @@
           </ac:spMkLst>
         </pc:spChg>
       </pc:sldChg>
-      <pc:sldChg chg="modNotesTx">
-        <pc:chgData name="Thad Schwebke" userId="8a3b078b179e4a90" providerId="LiveId" clId="{0FBDB5B2-C375-467E-96F5-E579F69E02D0}" dt="2020-02-23T01:24:15.708" v="133" actId="20577"/>
+      <pc:sldChg chg="del modNotesTx">
+        <pc:chgData name="Thad Schwebke" userId="8a3b078b179e4a90" providerId="LiveId" clId="{0FBDB5B2-C375-467E-96F5-E579F69E02D0}" dt="2020-02-23T21:49:40.627" v="163" actId="47"/>
         <pc:sldMkLst>
           <pc:docMk/>
           <pc:sldMk cId="3849262026" sldId="261"/>
         </pc:sldMkLst>
       </pc:sldChg>
-      <pc:sldChg chg="ord modNotesTx">
-        <pc:chgData name="Thad Schwebke" userId="8a3b078b179e4a90" providerId="LiveId" clId="{0FBDB5B2-C375-467E-96F5-E579F69E02D0}" dt="2020-02-23T01:23:56.241" v="123"/>
+      <pc:sldChg chg="del ord modNotesTx">
+        <pc:chgData name="Thad Schwebke" userId="8a3b078b179e4a90" providerId="LiveId" clId="{0FBDB5B2-C375-467E-96F5-E579F69E02D0}" dt="2020-02-23T21:49:16.841" v="162" actId="47"/>
         <pc:sldMkLst>
           <pc:docMk/>
           <pc:sldMk cId="2460916010" sldId="262"/>
@@ -1186,7 +1185,7 @@
         </pc:spChg>
       </pc:sldChg>
       <pc:sldChg chg="addSp delSp modSp add mod">
-        <pc:chgData name="Thad Schwebke" userId="8a3b078b179e4a90" providerId="LiveId" clId="{0FBDB5B2-C375-467E-96F5-E579F69E02D0}" dt="2020-02-23T01:17:07.254" v="109" actId="20577"/>
+        <pc:chgData name="Thad Schwebke" userId="8a3b078b179e4a90" providerId="LiveId" clId="{0FBDB5B2-C375-467E-96F5-E579F69E02D0}" dt="2020-02-23T21:50:37.299" v="165" actId="478"/>
         <pc:sldMkLst>
           <pc:docMk/>
           <pc:sldMk cId="3664237376" sldId="273"/>
@@ -1197,6 +1196,14 @@
             <pc:docMk/>
             <pc:sldMk cId="3664237376" sldId="273"/>
             <ac:spMk id="2" creationId="{017A87FA-EFDD-4DF4-BA04-35493DDBAB2C}"/>
+          </ac:spMkLst>
+        </pc:spChg>
+        <pc:spChg chg="add del mod">
+          <ac:chgData name="Thad Schwebke" userId="8a3b078b179e4a90" providerId="LiveId" clId="{0FBDB5B2-C375-467E-96F5-E579F69E02D0}" dt="2020-02-23T21:50:37.299" v="165" actId="478"/>
+          <ac:spMkLst>
+            <pc:docMk/>
+            <pc:sldMk cId="3664237376" sldId="273"/>
+            <ac:spMk id="3" creationId="{842779C3-2E28-4420-9B17-E0AC7E94E6E7}"/>
           </ac:spMkLst>
         </pc:spChg>
         <pc:spChg chg="del">
@@ -1215,8 +1222,8 @@
             <ac:spMk id="4" creationId="{F04C7EA7-2EE2-4009-AA46-75A05E66E1FF}"/>
           </ac:spMkLst>
         </pc:spChg>
-        <pc:spChg chg="add mod">
-          <ac:chgData name="Thad Schwebke" userId="8a3b078b179e4a90" providerId="LiveId" clId="{0FBDB5B2-C375-467E-96F5-E579F69E02D0}" dt="2020-02-23T01:17:07.254" v="109" actId="20577"/>
+        <pc:spChg chg="add del mod">
+          <ac:chgData name="Thad Schwebke" userId="8a3b078b179e4a90" providerId="LiveId" clId="{0FBDB5B2-C375-467E-96F5-E579F69E02D0}" dt="2020-02-23T21:50:35.248" v="164" actId="478"/>
           <ac:spMkLst>
             <pc:docMk/>
             <pc:sldMk cId="3664237376" sldId="273"/>
@@ -1311,7 +1318,7 @@
           <a:p>
             <a:fld id="{4AECD13F-9E93-4C57-A5BD-336347054114}" type="datetimeFigureOut">
               <a:rPr lang="en-US" smtClean="0"/>
-              <a:t>2/22/2020</a:t>
+              <a:t>2/23/2020</a:t>
             </a:fld>
             <a:endParaRPr lang="en-US"/>
           </a:p>
@@ -1476,7 +1483,7 @@
           <a:p>
             <a:fld id="{621D9606-6FF7-49AF-A412-4D6AB767DFC4}" type="datetimeFigureOut">
               <a:rPr lang="en-US" smtClean="0"/>
-              <a:t>2/22/2020</a:t>
+              <a:t>2/23/2020</a:t>
             </a:fld>
             <a:endParaRPr lang="en-US"/>
           </a:p>
@@ -1791,6 +1798,28 @@
               <a:rPr lang="en-US" dirty="0"/>
               <a:t>Speaker: Rajesh</a:t>
             </a:r>
+          </a:p>
+          <a:p>
+            <a:endParaRPr lang="en-US" dirty="0"/>
+          </a:p>
+          <a:p>
+            <a:r>
+              <a:rPr lang="en-US" dirty="0"/>
+              <a:t>Firstly, Mr. CEO, we would like to thank for giving this opportunity to study your Beers and Breweries business and</a:t>
+            </a:r>
+            <a:r>
+              <a:rPr lang="en-US" sz="1200" b="0" i="1" kern="1200" dirty="0">
+                <a:solidFill>
+                  <a:schemeClr val="tx1"/>
+                </a:solidFill>
+                <a:effectLst/>
+                <a:latin typeface="+mn-lt"/>
+                <a:ea typeface="+mn-ea"/>
+                <a:cs typeface="+mn-cs"/>
+              </a:rPr>
+              <a:t> taking the time from your busy schedule to listen to our presentation.</a:t>
+            </a:r>
+            <a:endParaRPr lang="en-US" dirty="0"/>
           </a:p>
         </p:txBody>
       </p:sp>
@@ -2117,8 +2146,61 @@
           <a:p>
             <a:r>
               <a:rPr lang="en-US" dirty="0"/>
-              <a:t>Notes: </a:t>
+              <a:t>Notes: The primary focus of this presentation is to address some of the key questions.</a:t>
             </a:r>
+          </a:p>
+          <a:p>
+            <a:r>
+              <a:rPr lang="en-US" dirty="0"/>
+              <a:t>How many Breweries are there by state</a:t>
+            </a:r>
+          </a:p>
+          <a:p>
+            <a:r>
+              <a:rPr lang="en-US" dirty="0"/>
+              <a:t>Median Alcohol by Volume (ABV) and </a:t>
+            </a:r>
+            <a:r>
+              <a:rPr lang="en-US" sz="1200" b="0" i="0" kern="1200" dirty="0">
+                <a:solidFill>
+                  <a:schemeClr val="tx1"/>
+                </a:solidFill>
+                <a:effectLst/>
+                <a:latin typeface="+mn-lt"/>
+                <a:ea typeface="+mn-ea"/>
+                <a:cs typeface="+mn-cs"/>
+              </a:rPr>
+              <a:t> beer bitterness (IBU) by state </a:t>
+            </a:r>
+          </a:p>
+          <a:p>
+            <a:r>
+              <a:rPr lang="en-US" sz="1200" b="0" i="0" kern="1200" dirty="0">
+                <a:solidFill>
+                  <a:schemeClr val="tx1"/>
+                </a:solidFill>
+                <a:effectLst/>
+                <a:latin typeface="+mn-lt"/>
+                <a:ea typeface="+mn-ea"/>
+                <a:cs typeface="+mn-cs"/>
+              </a:rPr>
+              <a:t>Which states has beers with highest level of alcohol by volume and bitterness </a:t>
+            </a:r>
+          </a:p>
+          <a:p>
+            <a:r>
+              <a:rPr lang="en-US" sz="1200" b="0" i="0" kern="1200" dirty="0">
+                <a:solidFill>
+                  <a:schemeClr val="tx1"/>
+                </a:solidFill>
+                <a:effectLst/>
+                <a:latin typeface="+mn-lt"/>
+                <a:ea typeface="+mn-ea"/>
+                <a:cs typeface="+mn-cs"/>
+              </a:rPr>
+              <a:t>We will also present detailed information related to alcohol by volume and will also address the relation between alcohol by volume and bitterness</a:t>
+            </a:r>
+            <a:endParaRPr lang="en-US" dirty="0"/>
           </a:p>
         </p:txBody>
       </p:sp>
@@ -2210,7 +2292,7 @@
           <a:p>
             <a:r>
               <a:rPr lang="en-US" dirty="0"/>
-              <a:t>Notes: </a:t>
+              <a:t>Notes: Our analysis is based upon the two datasets, beers and breweries, which is provided by Budweiser</a:t>
             </a:r>
           </a:p>
           <a:p>
@@ -2318,8 +2400,49 @@
                 <a:ea typeface="+mn-ea"/>
                 <a:cs typeface="+mn-cs"/>
               </a:rPr>
-              <a:t>There are 62 (2.57%) observations where both ABV and IBU are empty, 943 (41.7%) observations where only IBU is empty. For all observations that had both only IBU empty, the NA value was changed to zero since having a non-bitter alcoholic beer is possible. Whereas we choose not to include any observations that had zero ABV. That just isn’t a real beer. This leaves us with only 2.57% of the observations not being used.</a:t>
+              <a:t>There are 62 (2.57%) observations where both ABV and IBU are empty, 943 (41.7%) observations where only IBU is empty. </a:t>
             </a:r>
+          </a:p>
+          <a:p>
+            <a:r>
+              <a:rPr lang="en-US" sz="1200" b="0" i="1" kern="1200" dirty="0">
+                <a:solidFill>
+                  <a:schemeClr val="tx1"/>
+                </a:solidFill>
+                <a:effectLst/>
+                <a:latin typeface="+mn-lt"/>
+                <a:ea typeface="+mn-ea"/>
+                <a:cs typeface="+mn-cs"/>
+              </a:rPr>
+              <a:t>For all observations that had both only IBU empty, the NA value was changed to zero since having a non-bitter alcoholic beer is possible. Whereas we choose not to include any observations that had zero ABV. That just isn’t a real beer. This leaves us with only 2.57% of the observations not being used.</a:t>
+            </a:r>
+          </a:p>
+          <a:p>
+            <a:endParaRPr lang="en-US" sz="1200" b="0" i="1" kern="1200" dirty="0">
+              <a:solidFill>
+                <a:schemeClr val="tx1"/>
+              </a:solidFill>
+              <a:effectLst/>
+              <a:latin typeface="+mn-lt"/>
+              <a:ea typeface="+mn-ea"/>
+              <a:cs typeface="+mn-cs"/>
+            </a:endParaRPr>
+          </a:p>
+          <a:p>
+            <a:r>
+              <a:rPr lang="en-US" sz="1200" b="0" i="1" kern="1200" dirty="0">
+                <a:solidFill>
+                  <a:schemeClr val="tx1"/>
+                </a:solidFill>
+                <a:effectLst/>
+                <a:latin typeface="+mn-lt"/>
+                <a:ea typeface="+mn-ea"/>
+                <a:cs typeface="+mn-cs"/>
+              </a:rPr>
+              <a:t>This is how we addressed missing values, there are 2.6% of observations where both ABV and IBU are empty and 41.7% of total observations just IBU, which are empty. We made some realistic assumption that, a beer can exist without bitterness but probably not without alcohol. So, we have excluded all the ABV observations with NA’s and replaced IBU NA’s with zeros </a:t>
+            </a:r>
+          </a:p>
+          <a:p>
             <a:endParaRPr lang="en-US" dirty="0"/>
           </a:p>
           <a:p>
@@ -2431,7 +2554,19 @@
             </a:r>
             <a:r>
               <a:rPr lang="en-US" dirty="0"/>
-              <a:t>. Prior to the merge, changing the column names was required to perform the merge. Two records in the merged dataset had cities that were the same but misspelled. Both of those records were cleaned up so the city names were consistent.</a:t>
+              <a:t>, which is common field for joining. </a:t>
+            </a:r>
+          </a:p>
+          <a:p>
+            <a:r>
+              <a:rPr lang="en-US" dirty="0"/>
+              <a:t>Prior to the merge, changing the column names was required to perform the merge. </a:t>
+            </a:r>
+          </a:p>
+          <a:p>
+            <a:r>
+              <a:rPr lang="en-US" dirty="0"/>
+              <a:t>Two records in the merged dataset had cities that were the same but misspelled. Both of those records were cleaned up so the city names were consistent.</a:t>
             </a:r>
           </a:p>
           <a:p>
@@ -2454,11 +2589,71 @@
           <a:bodyPr/>
           <a:lstStyle/>
           <a:p>
+            <a:pPr marL="0" marR="0" lvl="0" indent="0" algn="r" defTabSz="914400" rtl="0" eaLnBrk="1" fontAlgn="auto" latinLnBrk="0" hangingPunct="1">
+              <a:lnSpc>
+                <a:spcPct val="100000"/>
+              </a:lnSpc>
+              <a:spcBef>
+                <a:spcPts val="0"/>
+              </a:spcBef>
+              <a:spcAft>
+                <a:spcPts val="0"/>
+              </a:spcAft>
+              <a:buClrTx/>
+              <a:buSzTx/>
+              <a:buFontTx/>
+              <a:buNone/>
+              <a:tabLst/>
+              <a:defRPr/>
+            </a:pPr>
             <a:fld id="{274AE7AE-FCBF-419F-971E-04B351FA8EC0}" type="slidenum">
-              <a:rPr lang="en-US" smtClean="0"/>
+              <a:rPr kumimoji="0" lang="en-US" sz="1200" b="0" i="0" u="none" strike="noStrike" kern="1200" cap="none" spc="0" normalizeH="0" baseline="0" noProof="0" smtClean="0">
+                <a:ln>
+                  <a:noFill/>
+                </a:ln>
+                <a:solidFill>
+                  <a:prstClr val="black"/>
+                </a:solidFill>
+                <a:effectLst/>
+                <a:uLnTx/>
+                <a:uFillTx/>
+                <a:latin typeface="Calibri"/>
+                <a:ea typeface="+mn-ea"/>
+                <a:cs typeface="+mn-cs"/>
+              </a:rPr>
+              <a:pPr marL="0" marR="0" lvl="0" indent="0" algn="r" defTabSz="914400" rtl="0" eaLnBrk="1" fontAlgn="auto" latinLnBrk="0" hangingPunct="1">
+                <a:lnSpc>
+                  <a:spcPct val="100000"/>
+                </a:lnSpc>
+                <a:spcBef>
+                  <a:spcPts val="0"/>
+                </a:spcBef>
+                <a:spcAft>
+                  <a:spcPts val="0"/>
+                </a:spcAft>
+                <a:buClrTx/>
+                <a:buSzTx/>
+                <a:buFontTx/>
+                <a:buNone/>
+                <a:tabLst/>
+                <a:defRPr/>
+              </a:pPr>
               <a:t>5</a:t>
             </a:fld>
-            <a:endParaRPr lang="en-US"/>
+            <a:endParaRPr kumimoji="0" lang="en-US" sz="1200" b="0" i="0" u="none" strike="noStrike" kern="1200" cap="none" spc="0" normalizeH="0" baseline="0" noProof="0">
+              <a:ln>
+                <a:noFill/>
+              </a:ln>
+              <a:solidFill>
+                <a:prstClr val="black"/>
+              </a:solidFill>
+              <a:effectLst/>
+              <a:uLnTx/>
+              <a:uFillTx/>
+              <a:latin typeface="Calibri"/>
+              <a:ea typeface="+mn-ea"/>
+              <a:cs typeface="+mn-cs"/>
+            </a:endParaRPr>
           </a:p>
         </p:txBody>
       </p:sp>
@@ -2527,7 +2722,25 @@
           <a:p>
             <a:r>
               <a:rPr lang="en-US" dirty="0"/>
-              <a:t>Notes: Colorado has 47 breweries which is 8 more than California which is second with 39 breweries. 4 states (DC, N Dakota, S Dakota, and West Virginia) only had 1 brewery and 4 more states (Arkansas, Delaware, Mississippi, and Nevada) only have two breweries. Nevada was a shock due to it being the home of Las Vegas. The highest number of breweries appears to be west of the Mississippi river. However, the northeast united states has its fair share.</a:t>
+              <a:t>Notes: Colorado has the highest breweries of  47  which is 8 more than second highest California with 39 breweries. </a:t>
+            </a:r>
+          </a:p>
+          <a:p>
+            <a:r>
+              <a:rPr lang="en-US" dirty="0"/>
+              <a:t>4 states (DC, N Dakota, S Dakota, and West Virginia) only had 1 brewery</a:t>
+            </a:r>
+          </a:p>
+          <a:p>
+            <a:r>
+              <a:rPr lang="en-US" dirty="0"/>
+              <a:t> and 4 more states (Arkansas, Delaware, Mississippi, and Nevada) only have two breweries. </a:t>
+            </a:r>
+          </a:p>
+          <a:p>
+            <a:r>
+              <a:rPr lang="en-US" dirty="0"/>
+              <a:t>Nevada was a shock due to it being the home of Las Vegas. The highest number of breweries appears to be west of the Mississippi river. However, the northeast united states has its fair share.</a:t>
             </a:r>
           </a:p>
           <a:p>
@@ -2550,11 +2763,71 @@
           <a:bodyPr/>
           <a:lstStyle/>
           <a:p>
+            <a:pPr marL="0" marR="0" lvl="0" indent="0" algn="r" defTabSz="914400" rtl="0" eaLnBrk="1" fontAlgn="auto" latinLnBrk="0" hangingPunct="1">
+              <a:lnSpc>
+                <a:spcPct val="100000"/>
+              </a:lnSpc>
+              <a:spcBef>
+                <a:spcPts val="0"/>
+              </a:spcBef>
+              <a:spcAft>
+                <a:spcPts val="0"/>
+              </a:spcAft>
+              <a:buClrTx/>
+              <a:buSzTx/>
+              <a:buFontTx/>
+              <a:buNone/>
+              <a:tabLst/>
+              <a:defRPr/>
+            </a:pPr>
             <a:fld id="{274AE7AE-FCBF-419F-971E-04B351FA8EC0}" type="slidenum">
-              <a:rPr lang="en-US" smtClean="0"/>
+              <a:rPr kumimoji="0" lang="en-US" sz="1200" b="0" i="0" u="none" strike="noStrike" kern="1200" cap="none" spc="0" normalizeH="0" baseline="0" noProof="0" smtClean="0">
+                <a:ln>
+                  <a:noFill/>
+                </a:ln>
+                <a:solidFill>
+                  <a:prstClr val="black"/>
+                </a:solidFill>
+                <a:effectLst/>
+                <a:uLnTx/>
+                <a:uFillTx/>
+                <a:latin typeface="Calibri"/>
+                <a:ea typeface="+mn-ea"/>
+                <a:cs typeface="+mn-cs"/>
+              </a:rPr>
+              <a:pPr marL="0" marR="0" lvl="0" indent="0" algn="r" defTabSz="914400" rtl="0" eaLnBrk="1" fontAlgn="auto" latinLnBrk="0" hangingPunct="1">
+                <a:lnSpc>
+                  <a:spcPct val="100000"/>
+                </a:lnSpc>
+                <a:spcBef>
+                  <a:spcPts val="0"/>
+                </a:spcBef>
+                <a:spcAft>
+                  <a:spcPts val="0"/>
+                </a:spcAft>
+                <a:buClrTx/>
+                <a:buSzTx/>
+                <a:buFontTx/>
+                <a:buNone/>
+                <a:tabLst/>
+                <a:defRPr/>
+              </a:pPr>
               <a:t>6</a:t>
             </a:fld>
-            <a:endParaRPr lang="en-US"/>
+            <a:endParaRPr kumimoji="0" lang="en-US" sz="1200" b="0" i="0" u="none" strike="noStrike" kern="1200" cap="none" spc="0" normalizeH="0" baseline="0" noProof="0">
+              <a:ln>
+                <a:noFill/>
+              </a:ln>
+              <a:solidFill>
+                <a:prstClr val="black"/>
+              </a:solidFill>
+              <a:effectLst/>
+              <a:uLnTx/>
+              <a:uFillTx/>
+              <a:latin typeface="Calibri"/>
+              <a:ea typeface="+mn-ea"/>
+              <a:cs typeface="+mn-cs"/>
+            </a:endParaRPr>
           </a:p>
         </p:txBody>
       </p:sp>
@@ -2635,7 +2908,49 @@
                 <a:ea typeface="+mn-ea"/>
                 <a:cs typeface="+mn-cs"/>
               </a:rPr>
-              <a:t>The median ABV per state appears somewhat consistent with an overall ABV median of 0.056. Kentucky has the highest median at 0.062 ABV and Utah has the lowest at 0.04 ABV. The median IBU per state appears to vary considerably between states with an overall IBU median of 37. West Virginia has the highest median at 57.5 IBU and Utah has the lowest at 6 IBU if you exclude the states with zero IBU.</a:t>
+              <a:t>The median ABV per state appears somewhat consistent with an overall ABV median of 0.056. </a:t>
+            </a:r>
+          </a:p>
+          <a:p>
+            <a:r>
+              <a:rPr lang="en-US" sz="1200" b="0" i="1" kern="1200" dirty="0">
+                <a:solidFill>
+                  <a:schemeClr val="tx1"/>
+                </a:solidFill>
+                <a:effectLst/>
+                <a:latin typeface="+mn-lt"/>
+                <a:ea typeface="+mn-ea"/>
+                <a:cs typeface="+mn-cs"/>
+              </a:rPr>
+              <a:t>Kentucky has the highest median at 0.062 ABV and Utah has the lowest at 0.04 ABV. </a:t>
+            </a:r>
+          </a:p>
+          <a:p>
+            <a:r>
+              <a:rPr lang="en-US" sz="1200" b="0" i="1" kern="1200" dirty="0">
+                <a:solidFill>
+                  <a:schemeClr val="tx1"/>
+                </a:solidFill>
+                <a:effectLst/>
+                <a:latin typeface="+mn-lt"/>
+                <a:ea typeface="+mn-ea"/>
+                <a:cs typeface="+mn-cs"/>
+              </a:rPr>
+              <a:t>The median IBU per state appears to vary considerably between states with an overall IBU median of 37. </a:t>
+            </a:r>
+          </a:p>
+          <a:p>
+            <a:r>
+              <a:rPr lang="en-US" sz="1200" b="0" i="1" kern="1200" dirty="0">
+                <a:solidFill>
+                  <a:schemeClr val="tx1"/>
+                </a:solidFill>
+                <a:effectLst/>
+                <a:latin typeface="+mn-lt"/>
+                <a:ea typeface="+mn-ea"/>
+                <a:cs typeface="+mn-cs"/>
+              </a:rPr>
+              <a:t>West Virginia has the highest median at 57.5 IBU and Utah has the lowest at 6 IBU if you exclude the states with zero IBU.</a:t>
             </a:r>
             <a:endParaRPr lang="en-US" sz="1200" b="0" i="0" kern="1200" dirty="0">
               <a:solidFill>
@@ -2646,12 +2961,6 @@
               <a:ea typeface="+mn-ea"/>
               <a:cs typeface="+mn-cs"/>
             </a:endParaRPr>
-          </a:p>
-          <a:p>
-            <a:endParaRPr lang="en-US" dirty="0"/>
-          </a:p>
-          <a:p>
-            <a:endParaRPr lang="en-US" dirty="0"/>
           </a:p>
         </p:txBody>
       </p:sp>
@@ -3154,7 +3463,7 @@
             <a:fld id="{FFF30096-E2FA-4C53-8FFA-C198FACBBC31}" type="datetimeFigureOut">
               <a:rPr lang="en-US" smtClean="0"/>
               <a:pPr/>
-              <a:t>2/22/2020</a:t>
+              <a:t>2/23/2020</a:t>
             </a:fld>
             <a:endParaRPr lang="en-US" dirty="0"/>
           </a:p>
@@ -10413,7 +10722,7 @@
             <a:fld id="{FFF30096-E2FA-4C53-8FFA-C198FACBBC31}" type="datetimeFigureOut">
               <a:rPr lang="en-US" smtClean="0"/>
               <a:pPr/>
-              <a:t>2/22/2020</a:t>
+              <a:t>2/23/2020</a:t>
             </a:fld>
             <a:endParaRPr lang="en-US" dirty="0"/>
           </a:p>
@@ -18087,7 +18396,7 @@
             <a:fld id="{FFF30096-E2FA-4C53-8FFA-C198FACBBC31}" type="datetimeFigureOut">
               <a:rPr lang="en-US" smtClean="0"/>
               <a:pPr/>
-              <a:t>2/22/2020</a:t>
+              <a:t>2/23/2020</a:t>
             </a:fld>
             <a:endParaRPr lang="en-US" dirty="0"/>
           </a:p>
@@ -18343,7 +18652,7 @@
             <a:fld id="{FFF30096-E2FA-4C53-8FFA-C198FACBBC31}" type="datetimeFigureOut">
               <a:rPr lang="en-US" smtClean="0"/>
               <a:pPr/>
-              <a:t>2/22/2020</a:t>
+              <a:t>2/23/2020</a:t>
             </a:fld>
             <a:endParaRPr lang="en-US" dirty="0"/>
           </a:p>
@@ -20117,7 +20426,7 @@
             <a:fld id="{FFF30096-E2FA-4C53-8FFA-C198FACBBC31}" type="datetimeFigureOut">
               <a:rPr lang="en-US" smtClean="0"/>
               <a:pPr/>
-              <a:t>2/22/2020</a:t>
+              <a:t>2/23/2020</a:t>
             </a:fld>
             <a:endParaRPr lang="en-US" dirty="0"/>
           </a:p>
@@ -20492,7 +20801,7 @@
             <a:fld id="{FFF30096-E2FA-4C53-8FFA-C198FACBBC31}" type="datetimeFigureOut">
               <a:rPr lang="en-US" smtClean="0"/>
               <a:pPr/>
-              <a:t>2/22/2020</a:t>
+              <a:t>2/23/2020</a:t>
             </a:fld>
             <a:endParaRPr lang="en-US"/>
           </a:p>
@@ -21324,34 +21633,6 @@
             <a:r>
               <a:rPr lang="en-US" dirty="0"/>
               <a:t>Thank You!</a:t>
-            </a:r>
-          </a:p>
-        </p:txBody>
-      </p:sp>
-      <p:sp>
-        <p:nvSpPr>
-          <p:cNvPr id="5" name="Text Placeholder 4">
-            <a:extLst>
-              <a:ext uri="{FF2B5EF4-FFF2-40B4-BE49-F238E27FC236}">
-                <a16:creationId xmlns:a16="http://schemas.microsoft.com/office/drawing/2014/main" id="{B7032DA9-3084-428D-B16D-24511F6F7009}"/>
-              </a:ext>
-            </a:extLst>
-          </p:cNvPr>
-          <p:cNvSpPr>
-            <a:spLocks noGrp="1"/>
-          </p:cNvSpPr>
-          <p:nvPr>
-            <p:ph type="body" sz="quarter" idx="35"/>
-          </p:nvPr>
-        </p:nvSpPr>
-        <p:spPr/>
-        <p:txBody>
-          <a:bodyPr/>
-          <a:lstStyle/>
-          <a:p>
-            <a:r>
-              <a:rPr lang="en-US" dirty="0"/>
-              <a:t>&lt;SUMMARY&gt;</a:t>
             </a:r>
           </a:p>
         </p:txBody>
@@ -22384,10 +22665,10 @@
       </p:sp>
       <p:pic>
         <p:nvPicPr>
-          <p:cNvPr id="4" name="Picture 3">
+          <p:cNvPr id="7" name="Picture 6" descr="A screenshot of a cell phone&#10;&#10;Description automatically generated">
             <a:extLst>
               <a:ext uri="{FF2B5EF4-FFF2-40B4-BE49-F238E27FC236}">
-                <a16:creationId xmlns:a16="http://schemas.microsoft.com/office/drawing/2014/main" id="{C230CC9A-AA53-4CB2-95F8-89DC600FCAFC}"/>
+                <a16:creationId xmlns:a16="http://schemas.microsoft.com/office/drawing/2014/main" id="{9B2B2316-995C-0046-9A95-D551416D36B2}"/>
               </a:ext>
             </a:extLst>
           </p:cNvPr>
@@ -22397,27 +22678,57 @@
           <p:nvPr/>
         </p:nvPicPr>
         <p:blipFill>
-          <a:blip r:embed="rId3"/>
+          <a:blip r:embed="rId3">
+            <a:extLst>
+              <a:ext uri="{28A0092B-C50C-407E-A947-70E740481C1C}">
+                <a14:useLocalDpi xmlns:a14="http://schemas.microsoft.com/office/drawing/2010/main" val="0"/>
+              </a:ext>
+            </a:extLst>
+          </a:blip>
           <a:stretch>
             <a:fillRect/>
           </a:stretch>
         </p:blipFill>
         <p:spPr>
           <a:xfrm>
-            <a:off x="152400" y="1063228"/>
-            <a:ext cx="5787160" cy="1554480"/>
+            <a:off x="4495800" y="1313134"/>
+            <a:ext cx="4495800" cy="1258616"/>
           </a:xfrm>
           <a:prstGeom prst="rect">
             <a:avLst/>
           </a:prstGeom>
+          <a:noFill/>
+          <a:ln w="9525" cap="flat" cmpd="sng" algn="ctr">
+            <a:solidFill>
+              <a:schemeClr val="accent2"/>
+            </a:solidFill>
+            <a:prstDash val="solid"/>
+            <a:round/>
+            <a:headEnd type="none" w="med" len="med"/>
+            <a:tailEnd type="none" w="med" len="med"/>
+          </a:ln>
         </p:spPr>
+        <p:style>
+          <a:lnRef idx="0">
+            <a:scrgbClr r="0" g="0" b="0"/>
+          </a:lnRef>
+          <a:fillRef idx="0">
+            <a:scrgbClr r="0" g="0" b="0"/>
+          </a:fillRef>
+          <a:effectRef idx="0">
+            <a:scrgbClr r="0" g="0" b="0"/>
+          </a:effectRef>
+          <a:fontRef idx="minor">
+            <a:schemeClr val="accent2"/>
+          </a:fontRef>
+        </p:style>
       </p:pic>
       <p:pic>
         <p:nvPicPr>
-          <p:cNvPr id="5" name="Picture 4">
+          <p:cNvPr id="14" name="Picture 13" descr="A screenshot of a cell phone&#10;&#10;Description automatically generated">
             <a:extLst>
               <a:ext uri="{FF2B5EF4-FFF2-40B4-BE49-F238E27FC236}">
-                <a16:creationId xmlns:a16="http://schemas.microsoft.com/office/drawing/2014/main" id="{EEC5FDBD-EA7A-4924-8D84-94C46331C6D1}"/>
+                <a16:creationId xmlns:a16="http://schemas.microsoft.com/office/drawing/2014/main" id="{ECE1F50D-8F1A-F644-9916-959807B6A368}"/>
               </a:ext>
             </a:extLst>
           </p:cNvPr>
@@ -22427,27 +22738,187 @@
           <p:nvPr/>
         </p:nvPicPr>
         <p:blipFill>
-          <a:blip r:embed="rId4"/>
+          <a:blip r:embed="rId4">
+            <a:extLst>
+              <a:ext uri="{28A0092B-C50C-407E-A947-70E740481C1C}">
+                <a14:useLocalDpi xmlns:a14="http://schemas.microsoft.com/office/drawing/2010/main" val="0"/>
+              </a:ext>
+            </a:extLst>
+          </a:blip>
           <a:stretch>
             <a:fillRect/>
           </a:stretch>
         </p:blipFill>
         <p:spPr>
           <a:xfrm>
-            <a:off x="4114800" y="1063228"/>
-            <a:ext cx="5755946" cy="1554480"/>
+            <a:off x="132346" y="1313134"/>
+            <a:ext cx="4287254" cy="1261872"/>
           </a:xfrm>
           <a:prstGeom prst="rect">
             <a:avLst/>
           </a:prstGeom>
+          <a:noFill/>
+          <a:ln w="9525" cap="flat" cmpd="sng" algn="ctr">
+            <a:solidFill>
+              <a:schemeClr val="accent2"/>
+            </a:solidFill>
+            <a:prstDash val="solid"/>
+            <a:round/>
+            <a:headEnd type="none" w="med" len="med"/>
+            <a:tailEnd type="none" w="med" len="med"/>
+          </a:ln>
         </p:spPr>
+        <p:style>
+          <a:lnRef idx="0">
+            <a:scrgbClr r="0" g="0" b="0"/>
+          </a:lnRef>
+          <a:fillRef idx="0">
+            <a:scrgbClr r="0" g="0" b="0"/>
+          </a:fillRef>
+          <a:effectRef idx="0">
+            <a:scrgbClr r="0" g="0" b="0"/>
+          </a:effectRef>
+          <a:fontRef idx="minor">
+            <a:schemeClr val="accent2"/>
+          </a:fontRef>
+        </p:style>
       </p:pic>
+      <p:sp>
+        <p:nvSpPr>
+          <p:cNvPr id="15" name="TextBox 14">
+            <a:extLst>
+              <a:ext uri="{FF2B5EF4-FFF2-40B4-BE49-F238E27FC236}">
+                <a16:creationId xmlns:a16="http://schemas.microsoft.com/office/drawing/2014/main" id="{904BA7C6-EE02-0142-BAC4-820A40CD345B}"/>
+              </a:ext>
+            </a:extLst>
+          </p:cNvPr>
+          <p:cNvSpPr txBox="1"/>
+          <p:nvPr/>
+        </p:nvSpPr>
+        <p:spPr>
+          <a:xfrm>
+            <a:off x="2059012" y="971550"/>
+            <a:ext cx="673582" cy="369332"/>
+          </a:xfrm>
+          <a:prstGeom prst="rect">
+            <a:avLst/>
+          </a:prstGeom>
+          <a:noFill/>
+        </p:spPr>
+        <p:txBody>
+          <a:bodyPr wrap="none" rtlCol="0">
+            <a:spAutoFit/>
+          </a:bodyPr>
+          <a:lstStyle/>
+          <a:p>
+            <a:pPr marL="0" marR="0" lvl="0" indent="0" algn="l" defTabSz="914400" rtl="0" eaLnBrk="1" fontAlgn="auto" latinLnBrk="0" hangingPunct="1">
+              <a:lnSpc>
+                <a:spcPct val="100000"/>
+              </a:lnSpc>
+              <a:spcBef>
+                <a:spcPts val="0"/>
+              </a:spcBef>
+              <a:spcAft>
+                <a:spcPts val="0"/>
+              </a:spcAft>
+              <a:buClrTx/>
+              <a:buSzTx/>
+              <a:buFontTx/>
+              <a:buNone/>
+              <a:tabLst/>
+              <a:defRPr/>
+            </a:pPr>
+            <a:r>
+              <a:rPr kumimoji="0" lang="en-US" sz="1800" b="0" i="0" u="none" strike="noStrike" kern="1200" cap="none" spc="0" normalizeH="0" baseline="0" noProof="0" dirty="0">
+                <a:ln>
+                  <a:noFill/>
+                </a:ln>
+                <a:solidFill>
+                  <a:srgbClr val="494C4F"/>
+                </a:solidFill>
+                <a:effectLst/>
+                <a:uLnTx/>
+                <a:uFillTx/>
+                <a:latin typeface="Times" pitchFamily="2" charset="0"/>
+                <a:ea typeface="+mn-ea"/>
+                <a:cs typeface="+mn-cs"/>
+              </a:rPr>
+              <a:t>Beer </a:t>
+            </a:r>
+          </a:p>
+        </p:txBody>
+      </p:sp>
+      <p:sp>
+        <p:nvSpPr>
+          <p:cNvPr id="16" name="TextBox 15">
+            <a:extLst>
+              <a:ext uri="{FF2B5EF4-FFF2-40B4-BE49-F238E27FC236}">
+                <a16:creationId xmlns:a16="http://schemas.microsoft.com/office/drawing/2014/main" id="{85C4878F-559B-F444-B846-111CBFA6BC92}"/>
+              </a:ext>
+            </a:extLst>
+          </p:cNvPr>
+          <p:cNvSpPr txBox="1"/>
+          <p:nvPr/>
+        </p:nvSpPr>
+        <p:spPr>
+          <a:xfrm>
+            <a:off x="6543139" y="971550"/>
+            <a:ext cx="1117807" cy="369332"/>
+          </a:xfrm>
+          <a:prstGeom prst="rect">
+            <a:avLst/>
+          </a:prstGeom>
+          <a:noFill/>
+        </p:spPr>
+        <p:txBody>
+          <a:bodyPr wrap="none" rtlCol="0">
+            <a:spAutoFit/>
+          </a:bodyPr>
+          <a:lstStyle/>
+          <a:p>
+            <a:pPr marL="0" marR="0" lvl="0" indent="0" algn="l" defTabSz="914400" rtl="0" eaLnBrk="1" fontAlgn="auto" latinLnBrk="0" hangingPunct="1">
+              <a:lnSpc>
+                <a:spcPct val="100000"/>
+              </a:lnSpc>
+              <a:spcBef>
+                <a:spcPts val="0"/>
+              </a:spcBef>
+              <a:spcAft>
+                <a:spcPts val="0"/>
+              </a:spcAft>
+              <a:buClrTx/>
+              <a:buSzTx/>
+              <a:buFontTx/>
+              <a:buNone/>
+              <a:tabLst/>
+              <a:defRPr/>
+            </a:pPr>
+            <a:r>
+              <a:rPr kumimoji="0" lang="en-US" sz="1800" b="0" i="0" u="none" strike="noStrike" kern="1200" cap="none" spc="0" normalizeH="0" baseline="0" noProof="0" dirty="0">
+                <a:ln>
+                  <a:noFill/>
+                </a:ln>
+                <a:solidFill>
+                  <a:srgbClr val="494C4F"/>
+                </a:solidFill>
+                <a:effectLst/>
+                <a:uLnTx/>
+                <a:uFillTx/>
+                <a:latin typeface="Times" pitchFamily="2" charset="0"/>
+                <a:ea typeface="+mn-ea"/>
+                <a:cs typeface="+mn-cs"/>
+              </a:rPr>
+              <a:t>Breweries</a:t>
+            </a:r>
+          </a:p>
+        </p:txBody>
+      </p:sp>
       <p:pic>
         <p:nvPicPr>
-          <p:cNvPr id="6" name="Picture 5">
+          <p:cNvPr id="18" name="Picture 17" descr="A screenshot of a cell phone&#10;&#10;Description automatically generated">
             <a:extLst>
               <a:ext uri="{FF2B5EF4-FFF2-40B4-BE49-F238E27FC236}">
-                <a16:creationId xmlns:a16="http://schemas.microsoft.com/office/drawing/2014/main" id="{99CA9CC8-D41E-4EC2-9AD9-88EAA1C3F8F8}"/>
+                <a16:creationId xmlns:a16="http://schemas.microsoft.com/office/drawing/2014/main" id="{0B3B1B90-924A-2A43-9D08-04E3F0140B87}"/>
               </a:ext>
             </a:extLst>
           </p:cNvPr>
@@ -22457,66 +22928,648 @@
           <p:nvPr/>
         </p:nvPicPr>
         <p:blipFill>
-          <a:blip r:embed="rId4"/>
+          <a:blip r:embed="rId5">
+            <a:extLst>
+              <a:ext uri="{28A0092B-C50C-407E-A947-70E740481C1C}">
+                <a14:useLocalDpi xmlns:a14="http://schemas.microsoft.com/office/drawing/2010/main" val="0"/>
+              </a:ext>
+            </a:extLst>
+          </a:blip>
           <a:stretch>
             <a:fillRect/>
           </a:stretch>
         </p:blipFill>
         <p:spPr>
           <a:xfrm>
-            <a:off x="1905000" y="3028950"/>
-            <a:ext cx="5755946" cy="1554480"/>
+            <a:off x="1371600" y="3181350"/>
+            <a:ext cx="6172200" cy="1484026"/>
           </a:xfrm>
           <a:prstGeom prst="rect">
             <a:avLst/>
           </a:prstGeom>
         </p:spPr>
+        <p:style>
+          <a:lnRef idx="2">
+            <a:schemeClr val="accent3"/>
+          </a:lnRef>
+          <a:fillRef idx="1">
+            <a:schemeClr val="lt1"/>
+          </a:fillRef>
+          <a:effectRef idx="0">
+            <a:schemeClr val="accent3"/>
+          </a:effectRef>
+          <a:fontRef idx="minor">
+            <a:schemeClr val="dk1"/>
+          </a:fontRef>
+        </p:style>
       </p:pic>
       <p:sp>
         <p:nvSpPr>
-          <p:cNvPr id="9" name="TextBox 8">
+          <p:cNvPr id="19" name="Rectangle 18">
             <a:extLst>
               <a:ext uri="{FF2B5EF4-FFF2-40B4-BE49-F238E27FC236}">
-                <a16:creationId xmlns:a16="http://schemas.microsoft.com/office/drawing/2014/main" id="{9DAB8808-38A7-46F2-B73D-F269E6BEEAC4}"/>
+                <a16:creationId xmlns:a16="http://schemas.microsoft.com/office/drawing/2014/main" id="{2304A5A9-7687-5442-8877-C27A8DC66E41}"/>
               </a:ext>
             </a:extLst>
           </p:cNvPr>
-          <p:cNvSpPr txBox="1"/>
+          <p:cNvSpPr/>
           <p:nvPr/>
         </p:nvSpPr>
         <p:spPr>
           <a:xfrm>
-            <a:off x="228600" y="2800350"/>
-            <a:ext cx="1371600" cy="1477328"/>
+            <a:off x="1828800" y="2626644"/>
+            <a:ext cx="152400" cy="249906"/>
           </a:xfrm>
           <a:prstGeom prst="rect">
             <a:avLst/>
           </a:prstGeom>
-          <a:noFill/>
+          <a:solidFill>
+            <a:schemeClr val="accent3"/>
+          </a:solidFill>
+          <a:ln>
+            <a:noFill/>
+          </a:ln>
         </p:spPr>
+        <p:style>
+          <a:lnRef idx="0">
+            <a:scrgbClr r="0" g="0" b="0"/>
+          </a:lnRef>
+          <a:fillRef idx="0">
+            <a:scrgbClr r="0" g="0" b="0"/>
+          </a:fillRef>
+          <a:effectRef idx="0">
+            <a:scrgbClr r="0" g="0" b="0"/>
+          </a:effectRef>
+          <a:fontRef idx="minor">
+            <a:schemeClr val="lt1"/>
+          </a:fontRef>
+        </p:style>
         <p:txBody>
-          <a:bodyPr wrap="square" rtlCol="0">
-            <a:spAutoFit/>
-          </a:bodyPr>
+          <a:bodyPr rtlCol="0" anchor="ctr"/>
           <a:lstStyle/>
           <a:p>
-            <a:r>
-              <a:rPr lang="en-US" dirty="0"/>
-              <a:t>Insert single joined arrow that simulates the merge</a:t>
-            </a:r>
+            <a:pPr marL="0" marR="0" lvl="0" indent="0" algn="ctr" defTabSz="914400" rtl="0" eaLnBrk="1" fontAlgn="auto" latinLnBrk="0" hangingPunct="1">
+              <a:lnSpc>
+                <a:spcPct val="100000"/>
+              </a:lnSpc>
+              <a:spcBef>
+                <a:spcPts val="0"/>
+              </a:spcBef>
+              <a:spcAft>
+                <a:spcPts val="0"/>
+              </a:spcAft>
+              <a:buClrTx/>
+              <a:buSzTx/>
+              <a:buFontTx/>
+              <a:buNone/>
+              <a:tabLst/>
+              <a:defRPr/>
+            </a:pPr>
+            <a:endParaRPr kumimoji="0" lang="en-US" sz="1800" b="0" i="0" u="none" strike="noStrike" kern="1200" cap="none" spc="0" normalizeH="0" baseline="0" noProof="0">
+              <a:ln>
+                <a:noFill/>
+              </a:ln>
+              <a:solidFill>
+                <a:srgbClr val="FFFFFF"/>
+              </a:solidFill>
+              <a:effectLst/>
+              <a:uLnTx/>
+              <a:uFillTx/>
+              <a:latin typeface="Calibri"/>
+              <a:ea typeface="+mn-ea"/>
+              <a:cs typeface="+mn-cs"/>
+            </a:endParaRPr>
+          </a:p>
+        </p:txBody>
+      </p:sp>
+      <p:sp>
+        <p:nvSpPr>
+          <p:cNvPr id="20" name="Rectangle 19">
+            <a:extLst>
+              <a:ext uri="{FF2B5EF4-FFF2-40B4-BE49-F238E27FC236}">
+                <a16:creationId xmlns:a16="http://schemas.microsoft.com/office/drawing/2014/main" id="{C9BEED78-20BF-3A41-BEC2-AA63C84816C4}"/>
+              </a:ext>
+            </a:extLst>
+          </p:cNvPr>
+          <p:cNvSpPr/>
+          <p:nvPr/>
+        </p:nvSpPr>
+        <p:spPr>
+          <a:xfrm>
+            <a:off x="6781800" y="2626644"/>
+            <a:ext cx="152400" cy="249906"/>
+          </a:xfrm>
+          <a:prstGeom prst="rect">
+            <a:avLst/>
+          </a:prstGeom>
+          <a:solidFill>
+            <a:schemeClr val="accent3"/>
+          </a:solidFill>
+          <a:ln>
+            <a:noFill/>
+          </a:ln>
+        </p:spPr>
+        <p:style>
+          <a:lnRef idx="0">
+            <a:scrgbClr r="0" g="0" b="0"/>
+          </a:lnRef>
+          <a:fillRef idx="0">
+            <a:scrgbClr r="0" g="0" b="0"/>
+          </a:fillRef>
+          <a:effectRef idx="0">
+            <a:scrgbClr r="0" g="0" b="0"/>
+          </a:effectRef>
+          <a:fontRef idx="minor">
+            <a:schemeClr val="lt1"/>
+          </a:fontRef>
+        </p:style>
+        <p:txBody>
+          <a:bodyPr rtlCol="0" anchor="ctr"/>
+          <a:lstStyle/>
+          <a:p>
+            <a:pPr marL="0" marR="0" lvl="0" indent="0" algn="ctr" defTabSz="914400" rtl="0" eaLnBrk="1" fontAlgn="auto" latinLnBrk="0" hangingPunct="1">
+              <a:lnSpc>
+                <a:spcPct val="100000"/>
+              </a:lnSpc>
+              <a:spcBef>
+                <a:spcPts val="0"/>
+              </a:spcBef>
+              <a:spcAft>
+                <a:spcPts val="0"/>
+              </a:spcAft>
+              <a:buClrTx/>
+              <a:buSzTx/>
+              <a:buFontTx/>
+              <a:buNone/>
+              <a:tabLst/>
+              <a:defRPr/>
+            </a:pPr>
+            <a:endParaRPr kumimoji="0" lang="en-US" sz="1800" b="0" i="0" u="none" strike="noStrike" kern="1200" cap="none" spc="0" normalizeH="0" baseline="0" noProof="0">
+              <a:ln>
+                <a:noFill/>
+              </a:ln>
+              <a:solidFill>
+                <a:srgbClr val="FFFFFF"/>
+              </a:solidFill>
+              <a:effectLst/>
+              <a:uLnTx/>
+              <a:uFillTx/>
+              <a:latin typeface="Calibri"/>
+              <a:ea typeface="+mn-ea"/>
+              <a:cs typeface="+mn-cs"/>
+            </a:endParaRPr>
+          </a:p>
+        </p:txBody>
+      </p:sp>
+      <p:sp>
+        <p:nvSpPr>
+          <p:cNvPr id="21" name="Rectangle 20">
+            <a:extLst>
+              <a:ext uri="{FF2B5EF4-FFF2-40B4-BE49-F238E27FC236}">
+                <a16:creationId xmlns:a16="http://schemas.microsoft.com/office/drawing/2014/main" id="{4F2BF60A-B906-4B49-97A3-66ED59940B68}"/>
+              </a:ext>
+            </a:extLst>
+          </p:cNvPr>
+          <p:cNvSpPr/>
+          <p:nvPr/>
+        </p:nvSpPr>
+        <p:spPr>
+          <a:xfrm rot="5400000">
+            <a:off x="4329677" y="348227"/>
+            <a:ext cx="103646" cy="5105400"/>
+          </a:xfrm>
+          <a:prstGeom prst="rect">
+            <a:avLst/>
+          </a:prstGeom>
+          <a:solidFill>
+            <a:schemeClr val="accent3"/>
+          </a:solidFill>
+          <a:ln>
+            <a:noFill/>
+          </a:ln>
+        </p:spPr>
+        <p:style>
+          <a:lnRef idx="0">
+            <a:scrgbClr r="0" g="0" b="0"/>
+          </a:lnRef>
+          <a:fillRef idx="0">
+            <a:scrgbClr r="0" g="0" b="0"/>
+          </a:fillRef>
+          <a:effectRef idx="0">
+            <a:scrgbClr r="0" g="0" b="0"/>
+          </a:effectRef>
+          <a:fontRef idx="minor">
+            <a:schemeClr val="lt1"/>
+          </a:fontRef>
+        </p:style>
+        <p:txBody>
+          <a:bodyPr rtlCol="0" anchor="ctr"/>
+          <a:lstStyle/>
+          <a:p>
+            <a:pPr marL="0" marR="0" lvl="0" indent="0" algn="ctr" defTabSz="914400" rtl="0" eaLnBrk="1" fontAlgn="auto" latinLnBrk="0" hangingPunct="1">
+              <a:lnSpc>
+                <a:spcPct val="100000"/>
+              </a:lnSpc>
+              <a:spcBef>
+                <a:spcPts val="0"/>
+              </a:spcBef>
+              <a:spcAft>
+                <a:spcPts val="0"/>
+              </a:spcAft>
+              <a:buClrTx/>
+              <a:buSzTx/>
+              <a:buFontTx/>
+              <a:buNone/>
+              <a:tabLst/>
+              <a:defRPr/>
+            </a:pPr>
+            <a:endParaRPr kumimoji="0" lang="en-US" sz="1800" b="0" i="0" u="none" strike="noStrike" kern="1200" cap="none" spc="0" normalizeH="0" baseline="0" noProof="0">
+              <a:ln>
+                <a:noFill/>
+              </a:ln>
+              <a:solidFill>
+                <a:srgbClr val="FFFFFF"/>
+              </a:solidFill>
+              <a:effectLst/>
+              <a:uLnTx/>
+              <a:uFillTx/>
+              <a:latin typeface="Calibri"/>
+              <a:ea typeface="+mn-ea"/>
+              <a:cs typeface="+mn-cs"/>
+            </a:endParaRPr>
+          </a:p>
+        </p:txBody>
+      </p:sp>
+      <p:sp>
+        <p:nvSpPr>
+          <p:cNvPr id="22" name="Down Arrow 21">
+            <a:extLst>
+              <a:ext uri="{FF2B5EF4-FFF2-40B4-BE49-F238E27FC236}">
+                <a16:creationId xmlns:a16="http://schemas.microsoft.com/office/drawing/2014/main" id="{DA4A7877-B261-BC47-8CDE-0E37A651FFA1}"/>
+              </a:ext>
+            </a:extLst>
+          </p:cNvPr>
+          <p:cNvSpPr/>
+          <p:nvPr/>
+        </p:nvSpPr>
+        <p:spPr>
+          <a:xfrm>
+            <a:off x="4191000" y="2876550"/>
+            <a:ext cx="228600" cy="228600"/>
+          </a:xfrm>
+          <a:prstGeom prst="downArrow">
+            <a:avLst/>
+          </a:prstGeom>
+          <a:solidFill>
+            <a:schemeClr val="accent3"/>
+          </a:solidFill>
+          <a:ln>
+            <a:noFill/>
+          </a:ln>
+        </p:spPr>
+        <p:style>
+          <a:lnRef idx="0">
+            <a:scrgbClr r="0" g="0" b="0"/>
+          </a:lnRef>
+          <a:fillRef idx="0">
+            <a:scrgbClr r="0" g="0" b="0"/>
+          </a:fillRef>
+          <a:effectRef idx="0">
+            <a:scrgbClr r="0" g="0" b="0"/>
+          </a:effectRef>
+          <a:fontRef idx="minor">
+            <a:schemeClr val="lt1"/>
+          </a:fontRef>
+        </p:style>
+        <p:txBody>
+          <a:bodyPr rtlCol="0" anchor="ctr"/>
+          <a:lstStyle/>
+          <a:p>
+            <a:pPr marL="0" marR="0" lvl="0" indent="0" algn="ctr" defTabSz="914400" rtl="0" eaLnBrk="1" fontAlgn="auto" latinLnBrk="0" hangingPunct="1">
+              <a:lnSpc>
+                <a:spcPct val="100000"/>
+              </a:lnSpc>
+              <a:spcBef>
+                <a:spcPts val="0"/>
+              </a:spcBef>
+              <a:spcAft>
+                <a:spcPts val="0"/>
+              </a:spcAft>
+              <a:buClrTx/>
+              <a:buSzTx/>
+              <a:buFontTx/>
+              <a:buNone/>
+              <a:tabLst/>
+              <a:defRPr/>
+            </a:pPr>
+            <a:endParaRPr kumimoji="0" lang="en-US" sz="1800" b="0" i="0" u="none" strike="noStrike" kern="1200" cap="none" spc="0" normalizeH="0" baseline="0" noProof="0">
+              <a:ln>
+                <a:noFill/>
+              </a:ln>
+              <a:solidFill>
+                <a:srgbClr val="FFFFFF"/>
+              </a:solidFill>
+              <a:effectLst/>
+              <a:uLnTx/>
+              <a:uFillTx/>
+              <a:latin typeface="Calibri"/>
+              <a:ea typeface="+mn-ea"/>
+              <a:cs typeface="+mn-cs"/>
+            </a:endParaRPr>
           </a:p>
         </p:txBody>
       </p:sp>
     </p:spTree>
     <p:extLst>
       <p:ext uri="{BB962C8B-B14F-4D97-AF65-F5344CB8AC3E}">
-        <p14:creationId xmlns:p14="http://schemas.microsoft.com/office/powerpoint/2010/main" val="2460916010"/>
+        <p14:creationId xmlns:p14="http://schemas.microsoft.com/office/powerpoint/2010/main" val="2475493359"/>
       </p:ext>
     </p:extLst>
   </p:cSld>
   <p:clrMapOvr>
     <a:masterClrMapping/>
   </p:clrMapOvr>
+  <p:timing>
+    <p:tnLst>
+      <p:par>
+        <p:cTn id="1" dur="indefinite" restart="never" nodeType="tmRoot">
+          <p:childTnLst>
+            <p:seq concurrent="1" nextAc="seek">
+              <p:cTn id="2" dur="indefinite" nodeType="mainSeq">
+                <p:childTnLst>
+                  <p:par>
+                    <p:cTn id="3" fill="hold">
+                      <p:stCondLst>
+                        <p:cond delay="indefinite"/>
+                      </p:stCondLst>
+                      <p:childTnLst>
+                        <p:par>
+                          <p:cTn id="4" fill="hold">
+                            <p:stCondLst>
+                              <p:cond delay="0"/>
+                            </p:stCondLst>
+                            <p:childTnLst>
+                              <p:par>
+                                <p:cTn id="5" presetID="53" presetClass="entr" presetSubtype="16" fill="hold" nodeType="clickEffect">
+                                  <p:stCondLst>
+                                    <p:cond delay="0"/>
+                                  </p:stCondLst>
+                                  <p:childTnLst>
+                                    <p:set>
+                                      <p:cBhvr>
+                                        <p:cTn id="6" dur="1" fill="hold">
+                                          <p:stCondLst>
+                                            <p:cond delay="0"/>
+                                          </p:stCondLst>
+                                        </p:cTn>
+                                        <p:tgtEl>
+                                          <p:spTgt spid="14"/>
+                                        </p:tgtEl>
+                                        <p:attrNameLst>
+                                          <p:attrName>style.visibility</p:attrName>
+                                        </p:attrNameLst>
+                                      </p:cBhvr>
+                                      <p:to>
+                                        <p:strVal val="visible"/>
+                                      </p:to>
+                                    </p:set>
+                                    <p:anim calcmode="lin" valueType="num">
+                                      <p:cBhvr>
+                                        <p:cTn id="7" dur="500" fill="hold"/>
+                                        <p:tgtEl>
+                                          <p:spTgt spid="14"/>
+                                        </p:tgtEl>
+                                        <p:attrNameLst>
+                                          <p:attrName>ppt_w</p:attrName>
+                                        </p:attrNameLst>
+                                      </p:cBhvr>
+                                      <p:tavLst>
+                                        <p:tav tm="0">
+                                          <p:val>
+                                            <p:fltVal val="0"/>
+                                          </p:val>
+                                        </p:tav>
+                                        <p:tav tm="100000">
+                                          <p:val>
+                                            <p:strVal val="#ppt_w"/>
+                                          </p:val>
+                                        </p:tav>
+                                      </p:tavLst>
+                                    </p:anim>
+                                    <p:anim calcmode="lin" valueType="num">
+                                      <p:cBhvr>
+                                        <p:cTn id="8" dur="500" fill="hold"/>
+                                        <p:tgtEl>
+                                          <p:spTgt spid="14"/>
+                                        </p:tgtEl>
+                                        <p:attrNameLst>
+                                          <p:attrName>ppt_h</p:attrName>
+                                        </p:attrNameLst>
+                                      </p:cBhvr>
+                                      <p:tavLst>
+                                        <p:tav tm="0">
+                                          <p:val>
+                                            <p:fltVal val="0"/>
+                                          </p:val>
+                                        </p:tav>
+                                        <p:tav tm="100000">
+                                          <p:val>
+                                            <p:strVal val="#ppt_h"/>
+                                          </p:val>
+                                        </p:tav>
+                                      </p:tavLst>
+                                    </p:anim>
+                                    <p:animEffect transition="in" filter="fade">
+                                      <p:cBhvr>
+                                        <p:cTn id="9" dur="500"/>
+                                        <p:tgtEl>
+                                          <p:spTgt spid="14"/>
+                                        </p:tgtEl>
+                                      </p:cBhvr>
+                                    </p:animEffect>
+                                  </p:childTnLst>
+                                </p:cTn>
+                              </p:par>
+                            </p:childTnLst>
+                          </p:cTn>
+                        </p:par>
+                      </p:childTnLst>
+                    </p:cTn>
+                  </p:par>
+                  <p:par>
+                    <p:cTn id="10" fill="hold">
+                      <p:stCondLst>
+                        <p:cond delay="indefinite"/>
+                      </p:stCondLst>
+                      <p:childTnLst>
+                        <p:par>
+                          <p:cTn id="11" fill="hold">
+                            <p:stCondLst>
+                              <p:cond delay="0"/>
+                            </p:stCondLst>
+                            <p:childTnLst>
+                              <p:par>
+                                <p:cTn id="12" presetID="53" presetClass="entr" presetSubtype="16" fill="hold" nodeType="clickEffect">
+                                  <p:stCondLst>
+                                    <p:cond delay="0"/>
+                                  </p:stCondLst>
+                                  <p:childTnLst>
+                                    <p:set>
+                                      <p:cBhvr>
+                                        <p:cTn id="13" dur="1" fill="hold">
+                                          <p:stCondLst>
+                                            <p:cond delay="0"/>
+                                          </p:stCondLst>
+                                        </p:cTn>
+                                        <p:tgtEl>
+                                          <p:spTgt spid="7"/>
+                                        </p:tgtEl>
+                                        <p:attrNameLst>
+                                          <p:attrName>style.visibility</p:attrName>
+                                        </p:attrNameLst>
+                                      </p:cBhvr>
+                                      <p:to>
+                                        <p:strVal val="visible"/>
+                                      </p:to>
+                                    </p:set>
+                                    <p:anim calcmode="lin" valueType="num">
+                                      <p:cBhvr>
+                                        <p:cTn id="14" dur="500" fill="hold"/>
+                                        <p:tgtEl>
+                                          <p:spTgt spid="7"/>
+                                        </p:tgtEl>
+                                        <p:attrNameLst>
+                                          <p:attrName>ppt_w</p:attrName>
+                                        </p:attrNameLst>
+                                      </p:cBhvr>
+                                      <p:tavLst>
+                                        <p:tav tm="0">
+                                          <p:val>
+                                            <p:fltVal val="0"/>
+                                          </p:val>
+                                        </p:tav>
+                                        <p:tav tm="100000">
+                                          <p:val>
+                                            <p:strVal val="#ppt_w"/>
+                                          </p:val>
+                                        </p:tav>
+                                      </p:tavLst>
+                                    </p:anim>
+                                    <p:anim calcmode="lin" valueType="num">
+                                      <p:cBhvr>
+                                        <p:cTn id="15" dur="500" fill="hold"/>
+                                        <p:tgtEl>
+                                          <p:spTgt spid="7"/>
+                                        </p:tgtEl>
+                                        <p:attrNameLst>
+                                          <p:attrName>ppt_h</p:attrName>
+                                        </p:attrNameLst>
+                                      </p:cBhvr>
+                                      <p:tavLst>
+                                        <p:tav tm="0">
+                                          <p:val>
+                                            <p:fltVal val="0"/>
+                                          </p:val>
+                                        </p:tav>
+                                        <p:tav tm="100000">
+                                          <p:val>
+                                            <p:strVal val="#ppt_h"/>
+                                          </p:val>
+                                        </p:tav>
+                                      </p:tavLst>
+                                    </p:anim>
+                                    <p:animEffect transition="in" filter="fade">
+                                      <p:cBhvr>
+                                        <p:cTn id="16" dur="500"/>
+                                        <p:tgtEl>
+                                          <p:spTgt spid="7"/>
+                                        </p:tgtEl>
+                                      </p:cBhvr>
+                                    </p:animEffect>
+                                  </p:childTnLst>
+                                </p:cTn>
+                              </p:par>
+                            </p:childTnLst>
+                          </p:cTn>
+                        </p:par>
+                      </p:childTnLst>
+                    </p:cTn>
+                  </p:par>
+                  <p:par>
+                    <p:cTn id="17" fill="hold">
+                      <p:stCondLst>
+                        <p:cond delay="indefinite"/>
+                      </p:stCondLst>
+                      <p:childTnLst>
+                        <p:par>
+                          <p:cTn id="18" fill="hold">
+                            <p:stCondLst>
+                              <p:cond delay="0"/>
+                            </p:stCondLst>
+                            <p:childTnLst>
+                              <p:par>
+                                <p:cTn id="19" presetID="22" presetClass="entr" presetSubtype="4" fill="hold" nodeType="clickEffect">
+                                  <p:stCondLst>
+                                    <p:cond delay="0"/>
+                                  </p:stCondLst>
+                                  <p:childTnLst>
+                                    <p:set>
+                                      <p:cBhvr>
+                                        <p:cTn id="20" dur="1" fill="hold">
+                                          <p:stCondLst>
+                                            <p:cond delay="0"/>
+                                          </p:stCondLst>
+                                        </p:cTn>
+                                        <p:tgtEl>
+                                          <p:spTgt spid="18"/>
+                                        </p:tgtEl>
+                                        <p:attrNameLst>
+                                          <p:attrName>style.visibility</p:attrName>
+                                        </p:attrNameLst>
+                                      </p:cBhvr>
+                                      <p:to>
+                                        <p:strVal val="visible"/>
+                                      </p:to>
+                                    </p:set>
+                                    <p:animEffect transition="in" filter="wipe(down)">
+                                      <p:cBhvr>
+                                        <p:cTn id="21" dur="500"/>
+                                        <p:tgtEl>
+                                          <p:spTgt spid="18"/>
+                                        </p:tgtEl>
+                                      </p:cBhvr>
+                                    </p:animEffect>
+                                  </p:childTnLst>
+                                </p:cTn>
+                              </p:par>
+                            </p:childTnLst>
+                          </p:cTn>
+                        </p:par>
+                      </p:childTnLst>
+                    </p:cTn>
+                  </p:par>
+                </p:childTnLst>
+              </p:cTn>
+              <p:prevCondLst>
+                <p:cond evt="onPrev" delay="0">
+                  <p:tgtEl>
+                    <p:sldTgt/>
+                  </p:tgtEl>
+                </p:cond>
+              </p:prevCondLst>
+              <p:nextCondLst>
+                <p:cond evt="onNext" delay="0">
+                  <p:tgtEl>
+                    <p:sldTgt/>
+                  </p:tgtEl>
+                </p:cond>
+              </p:nextCondLst>
+            </p:seq>
+          </p:childTnLst>
+        </p:cTn>
+      </p:par>
+    </p:tnLst>
+  </p:timing>
 </p:sld>
 </file>
 
@@ -22537,51 +23590,6 @@
           <a:chExt cx="0" cy="0"/>
         </a:xfrm>
       </p:grpSpPr>
-      <p:pic>
-        <p:nvPicPr>
-          <p:cNvPr id="1026" name="Picture 2">
-            <a:extLst>
-              <a:ext uri="{FF2B5EF4-FFF2-40B4-BE49-F238E27FC236}">
-                <a16:creationId xmlns:a16="http://schemas.microsoft.com/office/drawing/2014/main" id="{5A51FBB7-2072-4C55-AD88-FD27BA8B63AA}"/>
-              </a:ext>
-            </a:extLst>
-          </p:cNvPr>
-          <p:cNvPicPr>
-            <a:picLocks noChangeAspect="1" noChangeArrowheads="1"/>
-          </p:cNvPicPr>
-          <p:nvPr/>
-        </p:nvPicPr>
-        <p:blipFill rotWithShape="1">
-          <a:blip r:embed="rId3">
-            <a:extLst>
-              <a:ext uri="{28A0092B-C50C-407E-A947-70E740481C1C}">
-                <a14:useLocalDpi xmlns:a14="http://schemas.microsoft.com/office/drawing/2010/main" val="0"/>
-              </a:ext>
-            </a:extLst>
-          </a:blip>
-          <a:srcRect l="6923" t="6410" r="8462"/>
-          <a:stretch/>
-        </p:blipFill>
-        <p:spPr bwMode="auto">
-          <a:xfrm>
-            <a:off x="2057400" y="1063228"/>
-            <a:ext cx="5029200" cy="3337560"/>
-          </a:xfrm>
-          <a:prstGeom prst="rect">
-            <a:avLst/>
-          </a:prstGeom>
-          <a:noFill/>
-          <a:extLst>
-            <a:ext uri="{909E8E84-426E-40DD-AFC4-6F175D3DCCD1}">
-              <a14:hiddenFill xmlns:a14="http://schemas.microsoft.com/office/drawing/2010/main">
-                <a:solidFill>
-                  <a:srgbClr val="FFFFFF"/>
-                </a:solidFill>
-              </a14:hiddenFill>
-            </a:ext>
-          </a:extLst>
-        </p:spPr>
-      </p:pic>
       <p:sp>
         <p:nvSpPr>
           <p:cNvPr id="2" name="Title 1">
@@ -22612,16 +23620,920 @@
           </a:p>
         </p:txBody>
       </p:sp>
+      <p:pic>
+        <p:nvPicPr>
+          <p:cNvPr id="4" name="Picture 2">
+            <a:extLst>
+              <a:ext uri="{FF2B5EF4-FFF2-40B4-BE49-F238E27FC236}">
+                <a16:creationId xmlns:a16="http://schemas.microsoft.com/office/drawing/2014/main" id="{EDA0E03F-363B-4503-A343-80113864BCD8}"/>
+              </a:ext>
+            </a:extLst>
+          </p:cNvPr>
+          <p:cNvPicPr>
+            <a:picLocks noChangeAspect="1" noChangeArrowheads="1"/>
+          </p:cNvPicPr>
+          <p:nvPr/>
+        </p:nvPicPr>
+        <p:blipFill rotWithShape="1">
+          <a:blip r:embed="rId3" cstate="print">
+            <a:extLst>
+              <a:ext uri="{28A0092B-C50C-407E-A947-70E740481C1C}">
+                <a14:useLocalDpi xmlns:a14="http://schemas.microsoft.com/office/drawing/2010/main" val="0"/>
+              </a:ext>
+            </a:extLst>
+          </a:blip>
+          <a:srcRect l="6923" t="6410" r="8462"/>
+          <a:stretch/>
+        </p:blipFill>
+        <p:spPr bwMode="auto">
+          <a:xfrm>
+            <a:off x="304800" y="1063228"/>
+            <a:ext cx="4454732" cy="2956322"/>
+          </a:xfrm>
+          <a:prstGeom prst="rect">
+            <a:avLst/>
+          </a:prstGeom>
+          <a:noFill/>
+          <a:extLst>
+            <a:ext uri="{909E8E84-426E-40DD-AFC4-6F175D3DCCD1}">
+              <a14:hiddenFill xmlns:a14="http://schemas.microsoft.com/office/drawing/2010/main">
+                <a:solidFill>
+                  <a:srgbClr val="FFFFFF"/>
+                </a:solidFill>
+              </a14:hiddenFill>
+            </a:ext>
+          </a:extLst>
+        </p:spPr>
+      </p:pic>
+      <p:grpSp>
+        <p:nvGrpSpPr>
+          <p:cNvPr id="5" name="Group 4">
+            <a:extLst>
+              <a:ext uri="{FF2B5EF4-FFF2-40B4-BE49-F238E27FC236}">
+                <a16:creationId xmlns:a16="http://schemas.microsoft.com/office/drawing/2014/main" id="{EBE66353-2D02-44C7-8798-C93B9385FBD6}"/>
+              </a:ext>
+            </a:extLst>
+          </p:cNvPr>
+          <p:cNvGrpSpPr/>
+          <p:nvPr/>
+        </p:nvGrpSpPr>
+        <p:grpSpPr>
+          <a:xfrm>
+            <a:off x="0" y="3333750"/>
+            <a:ext cx="1786328" cy="1155671"/>
+            <a:chOff x="463758" y="3304304"/>
+            <a:chExt cx="1786328" cy="1155671"/>
+          </a:xfrm>
+        </p:grpSpPr>
+        <p:pic>
+          <p:nvPicPr>
+            <p:cNvPr id="6" name="Picture 5" descr="A picture containing drawing, food&#10;&#10;Description automatically generated">
+              <a:extLst>
+                <a:ext uri="{FF2B5EF4-FFF2-40B4-BE49-F238E27FC236}">
+                  <a16:creationId xmlns:a16="http://schemas.microsoft.com/office/drawing/2014/main" id="{4AC0E741-C84A-4726-BCB9-86F5E4C011BE}"/>
+                </a:ext>
+              </a:extLst>
+            </p:cNvPr>
+            <p:cNvPicPr>
+              <a:picLocks noChangeAspect="1"/>
+            </p:cNvPicPr>
+            <p:nvPr/>
+          </p:nvPicPr>
+          <p:blipFill>
+            <a:blip r:embed="rId4">
+              <a:extLst>
+                <a:ext uri="{28A0092B-C50C-407E-A947-70E740481C1C}">
+                  <a14:useLocalDpi xmlns:a14="http://schemas.microsoft.com/office/drawing/2010/main" val="0"/>
+                </a:ext>
+              </a:extLst>
+            </a:blip>
+            <a:stretch>
+              <a:fillRect/>
+            </a:stretch>
+          </p:blipFill>
+          <p:spPr>
+            <a:xfrm>
+              <a:off x="463758" y="3304304"/>
+              <a:ext cx="1786328" cy="1155671"/>
+            </a:xfrm>
+            <a:prstGeom prst="rect">
+              <a:avLst/>
+            </a:prstGeom>
+          </p:spPr>
+        </p:pic>
+        <p:sp>
+          <p:nvSpPr>
+            <p:cNvPr id="7" name="TextBox 6">
+              <a:extLst>
+                <a:ext uri="{FF2B5EF4-FFF2-40B4-BE49-F238E27FC236}">
+                  <a16:creationId xmlns:a16="http://schemas.microsoft.com/office/drawing/2014/main" id="{A3483700-B4AE-4D36-BA36-1DE8B1794718}"/>
+                </a:ext>
+              </a:extLst>
+            </p:cNvPr>
+            <p:cNvSpPr txBox="1"/>
+            <p:nvPr/>
+          </p:nvSpPr>
+          <p:spPr>
+            <a:xfrm>
+              <a:off x="1339745" y="3666696"/>
+              <a:ext cx="342900" cy="215444"/>
+            </a:xfrm>
+            <a:prstGeom prst="rect">
+              <a:avLst/>
+            </a:prstGeom>
+            <a:noFill/>
+          </p:spPr>
+          <p:txBody>
+            <a:bodyPr wrap="square" rtlCol="0">
+              <a:spAutoFit/>
+            </a:bodyPr>
+            <a:lstStyle/>
+            <a:p>
+              <a:pPr marL="0" marR="0" lvl="0" indent="0" algn="l" defTabSz="914400" rtl="0" eaLnBrk="1" fontAlgn="auto" latinLnBrk="0" hangingPunct="1">
+                <a:lnSpc>
+                  <a:spcPct val="100000"/>
+                </a:lnSpc>
+                <a:spcBef>
+                  <a:spcPts val="0"/>
+                </a:spcBef>
+                <a:spcAft>
+                  <a:spcPts val="0"/>
+                </a:spcAft>
+                <a:buClrTx/>
+                <a:buSzTx/>
+                <a:buFontTx/>
+                <a:buNone/>
+                <a:tabLst/>
+                <a:defRPr/>
+              </a:pPr>
+              <a:r>
+                <a:rPr kumimoji="0" lang="en-US" sz="800" b="0" i="0" u="none" strike="noStrike" kern="1200" cap="none" spc="0" normalizeH="0" baseline="0" noProof="0" dirty="0">
+                  <a:ln>
+                    <a:noFill/>
+                  </a:ln>
+                  <a:solidFill>
+                    <a:srgbClr val="494C4F"/>
+                  </a:solidFill>
+                  <a:effectLst/>
+                  <a:uLnTx/>
+                  <a:uFillTx/>
+                  <a:latin typeface="Calibri"/>
+                  <a:ea typeface="+mn-ea"/>
+                  <a:cs typeface="+mn-cs"/>
+                </a:rPr>
+                <a:t>AK</a:t>
+              </a:r>
+            </a:p>
+          </p:txBody>
+        </p:sp>
+      </p:grpSp>
+      <p:grpSp>
+        <p:nvGrpSpPr>
+          <p:cNvPr id="8" name="Group 7">
+            <a:extLst>
+              <a:ext uri="{FF2B5EF4-FFF2-40B4-BE49-F238E27FC236}">
+                <a16:creationId xmlns:a16="http://schemas.microsoft.com/office/drawing/2014/main" id="{099554DF-8A97-4F23-B719-E4DB7A7D15D0}"/>
+              </a:ext>
+            </a:extLst>
+          </p:cNvPr>
+          <p:cNvGrpSpPr/>
+          <p:nvPr/>
+        </p:nvGrpSpPr>
+        <p:grpSpPr>
+          <a:xfrm>
+            <a:off x="1883451" y="3856822"/>
+            <a:ext cx="956872" cy="632599"/>
+            <a:chOff x="2377815" y="3751637"/>
+            <a:chExt cx="956872" cy="632599"/>
+          </a:xfrm>
+        </p:grpSpPr>
+        <p:pic>
+          <p:nvPicPr>
+            <p:cNvPr id="9" name="Picture 8" descr="A picture containing drawing, food&#10;&#10;Description automatically generated">
+              <a:extLst>
+                <a:ext uri="{FF2B5EF4-FFF2-40B4-BE49-F238E27FC236}">
+                  <a16:creationId xmlns:a16="http://schemas.microsoft.com/office/drawing/2014/main" id="{66146DFE-8544-41E8-B596-4D3C898188D9}"/>
+                </a:ext>
+              </a:extLst>
+            </p:cNvPr>
+            <p:cNvPicPr>
+              <a:picLocks noChangeAspect="1"/>
+            </p:cNvPicPr>
+            <p:nvPr/>
+          </p:nvPicPr>
+          <p:blipFill>
+            <a:blip r:embed="rId5">
+              <a:extLst>
+                <a:ext uri="{28A0092B-C50C-407E-A947-70E740481C1C}">
+                  <a14:useLocalDpi xmlns:a14="http://schemas.microsoft.com/office/drawing/2010/main" val="0"/>
+                </a:ext>
+              </a:extLst>
+            </a:blip>
+            <a:stretch>
+              <a:fillRect/>
+            </a:stretch>
+          </p:blipFill>
+          <p:spPr>
+            <a:xfrm>
+              <a:off x="2377815" y="3751637"/>
+              <a:ext cx="956872" cy="632599"/>
+            </a:xfrm>
+            <a:prstGeom prst="rect">
+              <a:avLst/>
+            </a:prstGeom>
+          </p:spPr>
+        </p:pic>
+        <p:sp>
+          <p:nvSpPr>
+            <p:cNvPr id="10" name="TextBox 9">
+              <a:extLst>
+                <a:ext uri="{FF2B5EF4-FFF2-40B4-BE49-F238E27FC236}">
+                  <a16:creationId xmlns:a16="http://schemas.microsoft.com/office/drawing/2014/main" id="{DE0C415E-776F-46E4-9821-0880206D3FF2}"/>
+                </a:ext>
+              </a:extLst>
+            </p:cNvPr>
+            <p:cNvSpPr txBox="1"/>
+            <p:nvPr/>
+          </p:nvSpPr>
+          <p:spPr>
+            <a:xfrm>
+              <a:off x="2884045" y="3960214"/>
+              <a:ext cx="342900" cy="215444"/>
+            </a:xfrm>
+            <a:prstGeom prst="rect">
+              <a:avLst/>
+            </a:prstGeom>
+            <a:noFill/>
+          </p:spPr>
+          <p:txBody>
+            <a:bodyPr wrap="square" rtlCol="0">
+              <a:spAutoFit/>
+            </a:bodyPr>
+            <a:lstStyle/>
+            <a:p>
+              <a:pPr marL="0" marR="0" lvl="0" indent="0" algn="l" defTabSz="914400" rtl="0" eaLnBrk="1" fontAlgn="auto" latinLnBrk="0" hangingPunct="1">
+                <a:lnSpc>
+                  <a:spcPct val="100000"/>
+                </a:lnSpc>
+                <a:spcBef>
+                  <a:spcPts val="0"/>
+                </a:spcBef>
+                <a:spcAft>
+                  <a:spcPts val="0"/>
+                </a:spcAft>
+                <a:buClrTx/>
+                <a:buSzTx/>
+                <a:buFontTx/>
+                <a:buNone/>
+                <a:tabLst/>
+                <a:defRPr/>
+              </a:pPr>
+              <a:r>
+                <a:rPr kumimoji="0" lang="en-US" sz="800" b="0" i="0" u="none" strike="noStrike" kern="1200" cap="none" spc="0" normalizeH="0" baseline="0" noProof="0" dirty="0">
+                  <a:ln>
+                    <a:noFill/>
+                  </a:ln>
+                  <a:solidFill>
+                    <a:srgbClr val="494C4F"/>
+                  </a:solidFill>
+                  <a:effectLst/>
+                  <a:uLnTx/>
+                  <a:uFillTx/>
+                  <a:latin typeface="Calibri"/>
+                  <a:ea typeface="+mn-ea"/>
+                  <a:cs typeface="+mn-cs"/>
+                </a:rPr>
+                <a:t>HI</a:t>
+              </a:r>
+            </a:p>
+          </p:txBody>
+        </p:sp>
+      </p:grpSp>
+      <p:sp>
+        <p:nvSpPr>
+          <p:cNvPr id="12" name="TextBox 11">
+            <a:extLst>
+              <a:ext uri="{FF2B5EF4-FFF2-40B4-BE49-F238E27FC236}">
+                <a16:creationId xmlns:a16="http://schemas.microsoft.com/office/drawing/2014/main" id="{E9C739FB-FCAC-4C35-A802-BA59270850A7}"/>
+              </a:ext>
+            </a:extLst>
+          </p:cNvPr>
+          <p:cNvSpPr txBox="1"/>
+          <p:nvPr/>
+        </p:nvSpPr>
+        <p:spPr>
+          <a:xfrm>
+            <a:off x="2283527" y="2865971"/>
+            <a:ext cx="274434" cy="200055"/>
+          </a:xfrm>
+          <a:prstGeom prst="rect">
+            <a:avLst/>
+          </a:prstGeom>
+          <a:noFill/>
+        </p:spPr>
+        <p:txBody>
+          <a:bodyPr wrap="none" rtlCol="0">
+            <a:spAutoFit/>
+          </a:bodyPr>
+          <a:lstStyle/>
+          <a:p>
+            <a:pPr marL="0" marR="0" lvl="0" indent="0" algn="l" defTabSz="914400" rtl="0" eaLnBrk="1" fontAlgn="auto" latinLnBrk="0" hangingPunct="1">
+              <a:lnSpc>
+                <a:spcPct val="100000"/>
+              </a:lnSpc>
+              <a:spcBef>
+                <a:spcPts val="0"/>
+              </a:spcBef>
+              <a:spcAft>
+                <a:spcPts val="0"/>
+              </a:spcAft>
+              <a:buClrTx/>
+              <a:buSzTx/>
+              <a:buFontTx/>
+              <a:buNone/>
+              <a:tabLst/>
+              <a:defRPr/>
+            </a:pPr>
+            <a:r>
+              <a:rPr kumimoji="0" lang="en-US" sz="700" b="0" i="0" u="none" strike="noStrike" kern="1200" cap="none" spc="0" normalizeH="0" baseline="0" noProof="0" dirty="0">
+                <a:ln>
+                  <a:noFill/>
+                </a:ln>
+                <a:solidFill>
+                  <a:srgbClr val="FF0000"/>
+                </a:solidFill>
+                <a:effectLst/>
+                <a:uLnTx/>
+                <a:uFillTx/>
+                <a:latin typeface="Calibri"/>
+                <a:ea typeface="+mn-ea"/>
+                <a:cs typeface="+mn-cs"/>
+              </a:rPr>
+              <a:t>28</a:t>
+            </a:r>
+          </a:p>
+        </p:txBody>
+      </p:sp>
+      <p:sp>
+        <p:nvSpPr>
+          <p:cNvPr id="14" name="TextBox 13">
+            <a:extLst>
+              <a:ext uri="{FF2B5EF4-FFF2-40B4-BE49-F238E27FC236}">
+                <a16:creationId xmlns:a16="http://schemas.microsoft.com/office/drawing/2014/main" id="{2F068543-6D36-4D1D-9D4E-0FD9E20F49DE}"/>
+              </a:ext>
+            </a:extLst>
+          </p:cNvPr>
+          <p:cNvSpPr txBox="1"/>
+          <p:nvPr/>
+        </p:nvSpPr>
+        <p:spPr>
+          <a:xfrm>
+            <a:off x="760179" y="2416022"/>
+            <a:ext cx="274434" cy="200055"/>
+          </a:xfrm>
+          <a:prstGeom prst="rect">
+            <a:avLst/>
+          </a:prstGeom>
+          <a:noFill/>
+        </p:spPr>
+        <p:txBody>
+          <a:bodyPr wrap="none" rtlCol="0">
+            <a:spAutoFit/>
+          </a:bodyPr>
+          <a:lstStyle/>
+          <a:p>
+            <a:pPr marL="0" marR="0" lvl="0" indent="0" algn="l" defTabSz="914400" rtl="0" eaLnBrk="1" fontAlgn="auto" latinLnBrk="0" hangingPunct="1">
+              <a:lnSpc>
+                <a:spcPct val="100000"/>
+              </a:lnSpc>
+              <a:spcBef>
+                <a:spcPts val="0"/>
+              </a:spcBef>
+              <a:spcAft>
+                <a:spcPts val="0"/>
+              </a:spcAft>
+              <a:buClrTx/>
+              <a:buSzTx/>
+              <a:buFontTx/>
+              <a:buNone/>
+              <a:tabLst/>
+              <a:defRPr/>
+            </a:pPr>
+            <a:r>
+              <a:rPr kumimoji="0" lang="en-US" sz="700" b="0" i="0" u="none" strike="noStrike" kern="1200" cap="none" spc="0" normalizeH="0" baseline="0" noProof="0" dirty="0">
+                <a:ln>
+                  <a:noFill/>
+                </a:ln>
+                <a:solidFill>
+                  <a:srgbClr val="FF0000"/>
+                </a:solidFill>
+                <a:effectLst/>
+                <a:uLnTx/>
+                <a:uFillTx/>
+                <a:latin typeface="Calibri"/>
+                <a:ea typeface="+mn-ea"/>
+                <a:cs typeface="+mn-cs"/>
+              </a:rPr>
+              <a:t>39</a:t>
+            </a:r>
+          </a:p>
+        </p:txBody>
+      </p:sp>
+      <p:sp>
+        <p:nvSpPr>
+          <p:cNvPr id="15" name="TextBox 14">
+            <a:extLst>
+              <a:ext uri="{FF2B5EF4-FFF2-40B4-BE49-F238E27FC236}">
+                <a16:creationId xmlns:a16="http://schemas.microsoft.com/office/drawing/2014/main" id="{3EB8C113-62EB-4383-BF2F-8E1274F9B96B}"/>
+              </a:ext>
+            </a:extLst>
+          </p:cNvPr>
+          <p:cNvSpPr txBox="1"/>
+          <p:nvPr/>
+        </p:nvSpPr>
+        <p:spPr>
+          <a:xfrm>
+            <a:off x="1850374" y="2159520"/>
+            <a:ext cx="274434" cy="200055"/>
+          </a:xfrm>
+          <a:prstGeom prst="rect">
+            <a:avLst/>
+          </a:prstGeom>
+          <a:noFill/>
+        </p:spPr>
+        <p:txBody>
+          <a:bodyPr wrap="none" rtlCol="0">
+            <a:spAutoFit/>
+          </a:bodyPr>
+          <a:lstStyle/>
+          <a:p>
+            <a:pPr marL="0" marR="0" lvl="0" indent="0" algn="l" defTabSz="914400" rtl="0" eaLnBrk="1" fontAlgn="auto" latinLnBrk="0" hangingPunct="1">
+              <a:lnSpc>
+                <a:spcPct val="100000"/>
+              </a:lnSpc>
+              <a:spcBef>
+                <a:spcPts val="0"/>
+              </a:spcBef>
+              <a:spcAft>
+                <a:spcPts val="0"/>
+              </a:spcAft>
+              <a:buClrTx/>
+              <a:buSzTx/>
+              <a:buFontTx/>
+              <a:buNone/>
+              <a:tabLst/>
+              <a:defRPr/>
+            </a:pPr>
+            <a:r>
+              <a:rPr kumimoji="0" lang="en-US" sz="700" b="0" i="0" u="none" strike="noStrike" kern="1200" cap="none" spc="0" normalizeH="0" baseline="0" noProof="0" dirty="0">
+                <a:ln>
+                  <a:noFill/>
+                </a:ln>
+                <a:solidFill>
+                  <a:srgbClr val="FF0000"/>
+                </a:solidFill>
+                <a:effectLst/>
+                <a:uLnTx/>
+                <a:uFillTx/>
+                <a:latin typeface="Calibri"/>
+                <a:ea typeface="+mn-ea"/>
+                <a:cs typeface="+mn-cs"/>
+              </a:rPr>
+              <a:t>47</a:t>
+            </a:r>
+            <a:endParaRPr kumimoji="0" lang="en-US" sz="600" b="0" i="0" u="none" strike="noStrike" kern="1200" cap="none" spc="0" normalizeH="0" baseline="0" noProof="0" dirty="0">
+              <a:ln>
+                <a:noFill/>
+              </a:ln>
+              <a:solidFill>
+                <a:srgbClr val="FF0000"/>
+              </a:solidFill>
+              <a:effectLst/>
+              <a:uLnTx/>
+              <a:uFillTx/>
+              <a:latin typeface="Calibri"/>
+              <a:ea typeface="+mn-ea"/>
+              <a:cs typeface="+mn-cs"/>
+            </a:endParaRPr>
+          </a:p>
+        </p:txBody>
+      </p:sp>
+      <p:pic>
+        <p:nvPicPr>
+          <p:cNvPr id="13" name="Picture 12" descr="A picture containing implement, pencil&#10;&#10;Description automatically generated">
+            <a:extLst>
+              <a:ext uri="{FF2B5EF4-FFF2-40B4-BE49-F238E27FC236}">
+                <a16:creationId xmlns:a16="http://schemas.microsoft.com/office/drawing/2014/main" id="{41430A5D-0B98-F942-89E4-1D72B40662D6}"/>
+              </a:ext>
+            </a:extLst>
+          </p:cNvPr>
+          <p:cNvPicPr>
+            <a:picLocks noChangeAspect="1"/>
+          </p:cNvPicPr>
+          <p:nvPr/>
+        </p:nvPicPr>
+        <p:blipFill>
+          <a:blip r:embed="rId6">
+            <a:extLst>
+              <a:ext uri="{28A0092B-C50C-407E-A947-70E740481C1C}">
+                <a14:useLocalDpi xmlns:a14="http://schemas.microsoft.com/office/drawing/2010/main" val="0"/>
+              </a:ext>
+            </a:extLst>
+          </a:blip>
+          <a:stretch>
+            <a:fillRect/>
+          </a:stretch>
+        </p:blipFill>
+        <p:spPr>
+          <a:xfrm>
+            <a:off x="4691200" y="1022473"/>
+            <a:ext cx="4300400" cy="2616077"/>
+          </a:xfrm>
+          <a:prstGeom prst="rect">
+            <a:avLst/>
+          </a:prstGeom>
+        </p:spPr>
+      </p:pic>
     </p:spTree>
     <p:extLst>
       <p:ext uri="{BB962C8B-B14F-4D97-AF65-F5344CB8AC3E}">
-        <p14:creationId xmlns:p14="http://schemas.microsoft.com/office/powerpoint/2010/main" val="3849262026"/>
+        <p14:creationId xmlns:p14="http://schemas.microsoft.com/office/powerpoint/2010/main" val="1478177033"/>
       </p:ext>
     </p:extLst>
   </p:cSld>
   <p:clrMapOvr>
     <a:masterClrMapping/>
   </p:clrMapOvr>
+  <p:timing>
+    <p:tnLst>
+      <p:par>
+        <p:cTn id="1" dur="indefinite" restart="never" nodeType="tmRoot">
+          <p:childTnLst>
+            <p:seq concurrent="1" nextAc="seek">
+              <p:cTn id="2" dur="indefinite" nodeType="mainSeq">
+                <p:childTnLst>
+                  <p:par>
+                    <p:cTn id="3" fill="hold">
+                      <p:stCondLst>
+                        <p:cond delay="indefinite"/>
+                      </p:stCondLst>
+                      <p:childTnLst>
+                        <p:par>
+                          <p:cTn id="4" fill="hold">
+                            <p:stCondLst>
+                              <p:cond delay="0"/>
+                            </p:stCondLst>
+                            <p:childTnLst>
+                              <p:par>
+                                <p:cTn id="5" presetID="5" presetClass="entr" presetSubtype="10" fill="hold" nodeType="clickEffect">
+                                  <p:stCondLst>
+                                    <p:cond delay="0"/>
+                                  </p:stCondLst>
+                                  <p:childTnLst>
+                                    <p:set>
+                                      <p:cBhvr>
+                                        <p:cTn id="6" dur="1" fill="hold">
+                                          <p:stCondLst>
+                                            <p:cond delay="0"/>
+                                          </p:stCondLst>
+                                        </p:cTn>
+                                        <p:tgtEl>
+                                          <p:spTgt spid="5"/>
+                                        </p:tgtEl>
+                                        <p:attrNameLst>
+                                          <p:attrName>style.visibility</p:attrName>
+                                        </p:attrNameLst>
+                                      </p:cBhvr>
+                                      <p:to>
+                                        <p:strVal val="visible"/>
+                                      </p:to>
+                                    </p:set>
+                                    <p:animEffect transition="in" filter="checkerboard(across)">
+                                      <p:cBhvr>
+                                        <p:cTn id="7" dur="500"/>
+                                        <p:tgtEl>
+                                          <p:spTgt spid="5"/>
+                                        </p:tgtEl>
+                                      </p:cBhvr>
+                                    </p:animEffect>
+                                  </p:childTnLst>
+                                </p:cTn>
+                              </p:par>
+                              <p:par>
+                                <p:cTn id="8" presetID="5" presetClass="entr" presetSubtype="10" fill="hold" nodeType="withEffect">
+                                  <p:stCondLst>
+                                    <p:cond delay="0"/>
+                                  </p:stCondLst>
+                                  <p:childTnLst>
+                                    <p:set>
+                                      <p:cBhvr>
+                                        <p:cTn id="9" dur="1" fill="hold">
+                                          <p:stCondLst>
+                                            <p:cond delay="0"/>
+                                          </p:stCondLst>
+                                        </p:cTn>
+                                        <p:tgtEl>
+                                          <p:spTgt spid="8"/>
+                                        </p:tgtEl>
+                                        <p:attrNameLst>
+                                          <p:attrName>style.visibility</p:attrName>
+                                        </p:attrNameLst>
+                                      </p:cBhvr>
+                                      <p:to>
+                                        <p:strVal val="visible"/>
+                                      </p:to>
+                                    </p:set>
+                                    <p:animEffect transition="in" filter="checkerboard(across)">
+                                      <p:cBhvr>
+                                        <p:cTn id="10" dur="500"/>
+                                        <p:tgtEl>
+                                          <p:spTgt spid="8"/>
+                                        </p:tgtEl>
+                                      </p:cBhvr>
+                                    </p:animEffect>
+                                  </p:childTnLst>
+                                </p:cTn>
+                              </p:par>
+                              <p:par>
+                                <p:cTn id="11" presetID="5" presetClass="entr" presetSubtype="10" fill="hold" nodeType="withEffect">
+                                  <p:stCondLst>
+                                    <p:cond delay="0"/>
+                                  </p:stCondLst>
+                                  <p:childTnLst>
+                                    <p:set>
+                                      <p:cBhvr>
+                                        <p:cTn id="12" dur="1" fill="hold">
+                                          <p:stCondLst>
+                                            <p:cond delay="0"/>
+                                          </p:stCondLst>
+                                        </p:cTn>
+                                        <p:tgtEl>
+                                          <p:spTgt spid="4"/>
+                                        </p:tgtEl>
+                                        <p:attrNameLst>
+                                          <p:attrName>style.visibility</p:attrName>
+                                        </p:attrNameLst>
+                                      </p:cBhvr>
+                                      <p:to>
+                                        <p:strVal val="visible"/>
+                                      </p:to>
+                                    </p:set>
+                                    <p:animEffect transition="in" filter="checkerboard(across)">
+                                      <p:cBhvr>
+                                        <p:cTn id="13" dur="500"/>
+                                        <p:tgtEl>
+                                          <p:spTgt spid="4"/>
+                                        </p:tgtEl>
+                                      </p:cBhvr>
+                                    </p:animEffect>
+                                  </p:childTnLst>
+                                </p:cTn>
+                              </p:par>
+                            </p:childTnLst>
+                          </p:cTn>
+                        </p:par>
+                      </p:childTnLst>
+                    </p:cTn>
+                  </p:par>
+                  <p:par>
+                    <p:cTn id="14" fill="hold">
+                      <p:stCondLst>
+                        <p:cond delay="indefinite"/>
+                      </p:stCondLst>
+                      <p:childTnLst>
+                        <p:par>
+                          <p:cTn id="15" fill="hold">
+                            <p:stCondLst>
+                              <p:cond delay="0"/>
+                            </p:stCondLst>
+                            <p:childTnLst>
+                              <p:par>
+                                <p:cTn id="16" presetID="18" presetClass="entr" presetSubtype="12" fill="hold" nodeType="clickEffect">
+                                  <p:stCondLst>
+                                    <p:cond delay="0"/>
+                                  </p:stCondLst>
+                                  <p:childTnLst>
+                                    <p:set>
+                                      <p:cBhvr>
+                                        <p:cTn id="17" dur="1" fill="hold">
+                                          <p:stCondLst>
+                                            <p:cond delay="0"/>
+                                          </p:stCondLst>
+                                        </p:cTn>
+                                        <p:tgtEl>
+                                          <p:spTgt spid="13"/>
+                                        </p:tgtEl>
+                                        <p:attrNameLst>
+                                          <p:attrName>style.visibility</p:attrName>
+                                        </p:attrNameLst>
+                                      </p:cBhvr>
+                                      <p:to>
+                                        <p:strVal val="visible"/>
+                                      </p:to>
+                                    </p:set>
+                                    <p:animEffect transition="in" filter="strips(downLeft)">
+                                      <p:cBhvr>
+                                        <p:cTn id="18" dur="500"/>
+                                        <p:tgtEl>
+                                          <p:spTgt spid="13"/>
+                                        </p:tgtEl>
+                                      </p:cBhvr>
+                                    </p:animEffect>
+                                  </p:childTnLst>
+                                </p:cTn>
+                              </p:par>
+                            </p:childTnLst>
+                          </p:cTn>
+                        </p:par>
+                      </p:childTnLst>
+                    </p:cTn>
+                  </p:par>
+                  <p:par>
+                    <p:cTn id="19" fill="hold">
+                      <p:stCondLst>
+                        <p:cond delay="indefinite"/>
+                      </p:stCondLst>
+                      <p:childTnLst>
+                        <p:par>
+                          <p:cTn id="20" fill="hold">
+                            <p:stCondLst>
+                              <p:cond delay="0"/>
+                            </p:stCondLst>
+                            <p:childTnLst>
+                              <p:par>
+                                <p:cTn id="21" presetID="5" presetClass="entr" presetSubtype="10" fill="hold" grpId="0" nodeType="clickEffect">
+                                  <p:stCondLst>
+                                    <p:cond delay="0"/>
+                                  </p:stCondLst>
+                                  <p:childTnLst>
+                                    <p:set>
+                                      <p:cBhvr>
+                                        <p:cTn id="22" dur="1" fill="hold">
+                                          <p:stCondLst>
+                                            <p:cond delay="0"/>
+                                          </p:stCondLst>
+                                        </p:cTn>
+                                        <p:tgtEl>
+                                          <p:spTgt spid="15"/>
+                                        </p:tgtEl>
+                                        <p:attrNameLst>
+                                          <p:attrName>style.visibility</p:attrName>
+                                        </p:attrNameLst>
+                                      </p:cBhvr>
+                                      <p:to>
+                                        <p:strVal val="visible"/>
+                                      </p:to>
+                                    </p:set>
+                                    <p:animEffect transition="in" filter="checkerboard(across)">
+                                      <p:cBhvr>
+                                        <p:cTn id="23" dur="500"/>
+                                        <p:tgtEl>
+                                          <p:spTgt spid="15"/>
+                                        </p:tgtEl>
+                                      </p:cBhvr>
+                                    </p:animEffect>
+                                  </p:childTnLst>
+                                </p:cTn>
+                              </p:par>
+                            </p:childTnLst>
+                          </p:cTn>
+                        </p:par>
+                      </p:childTnLst>
+                    </p:cTn>
+                  </p:par>
+                  <p:par>
+                    <p:cTn id="24" fill="hold">
+                      <p:stCondLst>
+                        <p:cond delay="indefinite"/>
+                      </p:stCondLst>
+                      <p:childTnLst>
+                        <p:par>
+                          <p:cTn id="25" fill="hold">
+                            <p:stCondLst>
+                              <p:cond delay="0"/>
+                            </p:stCondLst>
+                            <p:childTnLst>
+                              <p:par>
+                                <p:cTn id="26" presetID="5" presetClass="entr" presetSubtype="10" fill="hold" grpId="0" nodeType="clickEffect">
+                                  <p:stCondLst>
+                                    <p:cond delay="0"/>
+                                  </p:stCondLst>
+                                  <p:childTnLst>
+                                    <p:set>
+                                      <p:cBhvr>
+                                        <p:cTn id="27" dur="1" fill="hold">
+                                          <p:stCondLst>
+                                            <p:cond delay="0"/>
+                                          </p:stCondLst>
+                                        </p:cTn>
+                                        <p:tgtEl>
+                                          <p:spTgt spid="14"/>
+                                        </p:tgtEl>
+                                        <p:attrNameLst>
+                                          <p:attrName>style.visibility</p:attrName>
+                                        </p:attrNameLst>
+                                      </p:cBhvr>
+                                      <p:to>
+                                        <p:strVal val="visible"/>
+                                      </p:to>
+                                    </p:set>
+                                    <p:animEffect transition="in" filter="checkerboard(across)">
+                                      <p:cBhvr>
+                                        <p:cTn id="28" dur="500"/>
+                                        <p:tgtEl>
+                                          <p:spTgt spid="14"/>
+                                        </p:tgtEl>
+                                      </p:cBhvr>
+                                    </p:animEffect>
+                                  </p:childTnLst>
+                                </p:cTn>
+                              </p:par>
+                            </p:childTnLst>
+                          </p:cTn>
+                        </p:par>
+                      </p:childTnLst>
+                    </p:cTn>
+                  </p:par>
+                  <p:par>
+                    <p:cTn id="29" fill="hold">
+                      <p:stCondLst>
+                        <p:cond delay="indefinite"/>
+                      </p:stCondLst>
+                      <p:childTnLst>
+                        <p:par>
+                          <p:cTn id="30" fill="hold">
+                            <p:stCondLst>
+                              <p:cond delay="0"/>
+                            </p:stCondLst>
+                            <p:childTnLst>
+                              <p:par>
+                                <p:cTn id="31" presetID="5" presetClass="entr" presetSubtype="10" fill="hold" grpId="0" nodeType="clickEffect">
+                                  <p:stCondLst>
+                                    <p:cond delay="0"/>
+                                  </p:stCondLst>
+                                  <p:childTnLst>
+                                    <p:set>
+                                      <p:cBhvr>
+                                        <p:cTn id="32" dur="1" fill="hold">
+                                          <p:stCondLst>
+                                            <p:cond delay="0"/>
+                                          </p:stCondLst>
+                                        </p:cTn>
+                                        <p:tgtEl>
+                                          <p:spTgt spid="12"/>
+                                        </p:tgtEl>
+                                        <p:attrNameLst>
+                                          <p:attrName>style.visibility</p:attrName>
+                                        </p:attrNameLst>
+                                      </p:cBhvr>
+                                      <p:to>
+                                        <p:strVal val="visible"/>
+                                      </p:to>
+                                    </p:set>
+                                    <p:animEffect transition="in" filter="checkerboard(across)">
+                                      <p:cBhvr>
+                                        <p:cTn id="33" dur="500"/>
+                                        <p:tgtEl>
+                                          <p:spTgt spid="12"/>
+                                        </p:tgtEl>
+                                      </p:cBhvr>
+                                    </p:animEffect>
+                                  </p:childTnLst>
+                                </p:cTn>
+                              </p:par>
+                            </p:childTnLst>
+                          </p:cTn>
+                        </p:par>
+                      </p:childTnLst>
+                    </p:cTn>
+                  </p:par>
+                </p:childTnLst>
+              </p:cTn>
+              <p:prevCondLst>
+                <p:cond evt="onPrev" delay="0">
+                  <p:tgtEl>
+                    <p:sldTgt/>
+                  </p:tgtEl>
+                </p:cond>
+              </p:prevCondLst>
+              <p:nextCondLst>
+                <p:cond evt="onNext" delay="0">
+                  <p:tgtEl>
+                    <p:sldTgt/>
+                  </p:tgtEl>
+                </p:cond>
+              </p:nextCondLst>
+            </p:seq>
+          </p:childTnLst>
+        </p:cTn>
+      </p:par>
+    </p:tnLst>
+    <p:bldLst>
+      <p:bldP spid="12" grpId="0"/>
+      <p:bldP spid="14" grpId="0"/>
+      <p:bldP spid="15" grpId="0"/>
+    </p:bldLst>
+  </p:timing>
 </p:sld>
 </file>
 

</xml_diff>